<commit_message>
Updated documents and only required ones, deleted old ones
</commit_message>
<xml_diff>
--- a/Documentation/FlowDiagrams.pptx
+++ b/Documentation/FlowDiagrams.pptx
@@ -6,6 +6,7 @@
   </p:sldMasterIdLst>
   <p:sldIdLst>
     <p:sldId id="256" r:id="rId2"/>
+    <p:sldId id="257" r:id="rId3"/>
   </p:sldIdLst>
   <p:sldSz cx="18000663" cy="8999538"/>
   <p:notesSz cx="6858000" cy="9144000"/>
@@ -243,7 +244,7 @@
           <a:p>
             <a:fld id="{57D35CCF-2710-493D-9017-2F33E07762D3}" type="datetimeFigureOut">
               <a:rPr lang="en-IN" smtClean="0"/>
-              <a:t>06-01-2022</a:t>
+              <a:t>18-06-2022</a:t>
             </a:fld>
             <a:endParaRPr lang="en-IN"/>
           </a:p>
@@ -413,7 +414,7 @@
           <a:p>
             <a:fld id="{57D35CCF-2710-493D-9017-2F33E07762D3}" type="datetimeFigureOut">
               <a:rPr lang="en-IN" smtClean="0"/>
-              <a:t>06-01-2022</a:t>
+              <a:t>18-06-2022</a:t>
             </a:fld>
             <a:endParaRPr lang="en-IN"/>
           </a:p>
@@ -593,7 +594,7 @@
           <a:p>
             <a:fld id="{57D35CCF-2710-493D-9017-2F33E07762D3}" type="datetimeFigureOut">
               <a:rPr lang="en-IN" smtClean="0"/>
-              <a:t>06-01-2022</a:t>
+              <a:t>18-06-2022</a:t>
             </a:fld>
             <a:endParaRPr lang="en-IN"/>
           </a:p>
@@ -763,7 +764,7 @@
           <a:p>
             <a:fld id="{57D35CCF-2710-493D-9017-2F33E07762D3}" type="datetimeFigureOut">
               <a:rPr lang="en-IN" smtClean="0"/>
-              <a:t>06-01-2022</a:t>
+              <a:t>18-06-2022</a:t>
             </a:fld>
             <a:endParaRPr lang="en-IN"/>
           </a:p>
@@ -1009,7 +1010,7 @@
           <a:p>
             <a:fld id="{57D35CCF-2710-493D-9017-2F33E07762D3}" type="datetimeFigureOut">
               <a:rPr lang="en-IN" smtClean="0"/>
-              <a:t>06-01-2022</a:t>
+              <a:t>18-06-2022</a:t>
             </a:fld>
             <a:endParaRPr lang="en-IN"/>
           </a:p>
@@ -1241,7 +1242,7 @@
           <a:p>
             <a:fld id="{57D35CCF-2710-493D-9017-2F33E07762D3}" type="datetimeFigureOut">
               <a:rPr lang="en-IN" smtClean="0"/>
-              <a:t>06-01-2022</a:t>
+              <a:t>18-06-2022</a:t>
             </a:fld>
             <a:endParaRPr lang="en-IN"/>
           </a:p>
@@ -1608,7 +1609,7 @@
           <a:p>
             <a:fld id="{57D35CCF-2710-493D-9017-2F33E07762D3}" type="datetimeFigureOut">
               <a:rPr lang="en-IN" smtClean="0"/>
-              <a:t>06-01-2022</a:t>
+              <a:t>18-06-2022</a:t>
             </a:fld>
             <a:endParaRPr lang="en-IN"/>
           </a:p>
@@ -1726,7 +1727,7 @@
           <a:p>
             <a:fld id="{57D35CCF-2710-493D-9017-2F33E07762D3}" type="datetimeFigureOut">
               <a:rPr lang="en-IN" smtClean="0"/>
-              <a:t>06-01-2022</a:t>
+              <a:t>18-06-2022</a:t>
             </a:fld>
             <a:endParaRPr lang="en-IN"/>
           </a:p>
@@ -1821,7 +1822,7 @@
           <a:p>
             <a:fld id="{57D35CCF-2710-493D-9017-2F33E07762D3}" type="datetimeFigureOut">
               <a:rPr lang="en-IN" smtClean="0"/>
-              <a:t>06-01-2022</a:t>
+              <a:t>18-06-2022</a:t>
             </a:fld>
             <a:endParaRPr lang="en-IN"/>
           </a:p>
@@ -2098,7 +2099,7 @@
           <a:p>
             <a:fld id="{57D35CCF-2710-493D-9017-2F33E07762D3}" type="datetimeFigureOut">
               <a:rPr lang="en-IN" smtClean="0"/>
-              <a:t>06-01-2022</a:t>
+              <a:t>18-06-2022</a:t>
             </a:fld>
             <a:endParaRPr lang="en-IN"/>
           </a:p>
@@ -2355,7 +2356,7 @@
           <a:p>
             <a:fld id="{57D35CCF-2710-493D-9017-2F33E07762D3}" type="datetimeFigureOut">
               <a:rPr lang="en-IN" smtClean="0"/>
-              <a:t>06-01-2022</a:t>
+              <a:t>18-06-2022</a:t>
             </a:fld>
             <a:endParaRPr lang="en-IN"/>
           </a:p>
@@ -2568,7 +2569,7 @@
           <a:p>
             <a:fld id="{57D35CCF-2710-493D-9017-2F33E07762D3}" type="datetimeFigureOut">
               <a:rPr lang="en-IN" smtClean="0"/>
-              <a:t>06-01-2022</a:t>
+              <a:t>18-06-2022</a:t>
             </a:fld>
             <a:endParaRPr lang="en-IN"/>
           </a:p>
@@ -4686,14 +4687,12 @@
           </p:cNvPr>
           <p:cNvCxnSpPr>
             <a:cxnSpLocks/>
-            <a:stCxn id="6" idx="2"/>
-            <a:endCxn id="7" idx="0"/>
           </p:cNvCxnSpPr>
           <p:nvPr/>
         </p:nvCxnSpPr>
         <p:spPr>
           <a:xfrm rot="5400000">
-            <a:off x="5959813" y="-1707057"/>
+            <a:off x="5959814" y="-1707057"/>
             <a:ext cx="1202014" cy="6395403"/>
           </a:xfrm>
           <a:prstGeom prst="curvedConnector3">
@@ -5569,6 +5568,2585 @@
     <p:extLst>
       <p:ext uri="{BB962C8B-B14F-4D97-AF65-F5344CB8AC3E}">
         <p14:creationId xmlns:p14="http://schemas.microsoft.com/office/powerpoint/2010/main" val="3261347339"/>
+      </p:ext>
+    </p:extLst>
+  </p:cSld>
+  <p:clrMapOvr>
+    <a:masterClrMapping/>
+  </p:clrMapOvr>
+</p:sld>
+</file>
+
+<file path=ppt/slides/slide2.xml><?xml version="1.0" encoding="utf-8"?>
+<p:sld xmlns:a="http://schemas.openxmlformats.org/drawingml/2006/main" xmlns:r="http://schemas.openxmlformats.org/officeDocument/2006/relationships" xmlns:p="http://schemas.openxmlformats.org/presentationml/2006/main">
+  <p:cSld>
+    <p:spTree>
+      <p:nvGrpSpPr>
+        <p:cNvPr id="1" name=""/>
+        <p:cNvGrpSpPr/>
+        <p:nvPr/>
+      </p:nvGrpSpPr>
+      <p:grpSpPr>
+        <a:xfrm>
+          <a:off x="0" y="0"/>
+          <a:ext cx="0" cy="0"/>
+          <a:chOff x="0" y="0"/>
+          <a:chExt cx="0" cy="0"/>
+        </a:xfrm>
+      </p:grpSpPr>
+      <p:sp>
+        <p:nvSpPr>
+          <p:cNvPr id="2" name="Text Box 2">
+            <a:extLst>
+              <a:ext uri="{FF2B5EF4-FFF2-40B4-BE49-F238E27FC236}">
+                <a16:creationId xmlns:a16="http://schemas.microsoft.com/office/drawing/2014/main" id="{71DFF7B2-0384-B646-07A0-8EFD770CC357}"/>
+              </a:ext>
+            </a:extLst>
+          </p:cNvPr>
+          <p:cNvSpPr txBox="1"/>
+          <p:nvPr/>
+        </p:nvSpPr>
+        <p:spPr>
+          <a:xfrm>
+            <a:off x="5394636" y="1637344"/>
+            <a:ext cx="839470" cy="340995"/>
+          </a:xfrm>
+          <a:prstGeom prst="roundRect">
+            <a:avLst/>
+          </a:prstGeom>
+          <a:solidFill>
+            <a:schemeClr val="accent5">
+              <a:lumMod val="40000"/>
+              <a:lumOff val="60000"/>
+            </a:schemeClr>
+          </a:solidFill>
+          <a:ln w="28575">
+            <a:solidFill>
+              <a:schemeClr val="accent1"/>
+            </a:solidFill>
+          </a:ln>
+        </p:spPr>
+        <p:txBody>
+          <a:bodyPr rot="0" spcFirstLastPara="0" vert="horz" wrap="square" lIns="91440" tIns="45720" rIns="91440" bIns="45720" numCol="1" spcCol="0" rtlCol="0" fromWordArt="0" anchor="ctr" anchorCtr="0" forceAA="0" compatLnSpc="1">
+            <a:prstTxWarp prst="textNoShape">
+              <a:avLst/>
+            </a:prstTxWarp>
+            <a:noAutofit/>
+          </a:bodyPr>
+          <a:lstStyle/>
+          <a:p>
+            <a:pPr algn="ctr">
+              <a:lnSpc>
+                <a:spcPct val="107000"/>
+              </a:lnSpc>
+              <a:spcAft>
+                <a:spcPts val="800"/>
+              </a:spcAft>
+            </a:pPr>
+            <a:r>
+              <a:rPr lang="en-IN" sz="1100" b="1">
+                <a:effectLst/>
+                <a:latin typeface="Trebuchet MS" panose="020B0603020202020204" pitchFamily="34" charset="0"/>
+                <a:ea typeface="Calibri" panose="020F0502020204030204" pitchFamily="34" charset="0"/>
+                <a:cs typeface="Mangal" panose="02040503050203030202" pitchFamily="18" charset="0"/>
+              </a:rPr>
+              <a:t>LOGIN</a:t>
+            </a:r>
+            <a:endParaRPr lang="en-IN" sz="1100">
+              <a:effectLst/>
+              <a:latin typeface="Calibri" panose="020F0502020204030204" pitchFamily="34" charset="0"/>
+              <a:ea typeface="Calibri" panose="020F0502020204030204" pitchFamily="34" charset="0"/>
+              <a:cs typeface="Mangal" panose="02040503050203030202" pitchFamily="18" charset="0"/>
+            </a:endParaRPr>
+          </a:p>
+        </p:txBody>
+      </p:sp>
+      <p:sp>
+        <p:nvSpPr>
+          <p:cNvPr id="3" name="Text Box 4">
+            <a:extLst>
+              <a:ext uri="{FF2B5EF4-FFF2-40B4-BE49-F238E27FC236}">
+                <a16:creationId xmlns:a16="http://schemas.microsoft.com/office/drawing/2014/main" id="{51190E35-C090-6022-9B89-2C4514E4F25B}"/>
+              </a:ext>
+            </a:extLst>
+          </p:cNvPr>
+          <p:cNvSpPr txBox="1"/>
+          <p:nvPr/>
+        </p:nvSpPr>
+        <p:spPr>
+          <a:xfrm>
+            <a:off x="1955959" y="2876743"/>
+            <a:ext cx="1054100" cy="340995"/>
+          </a:xfrm>
+          <a:prstGeom prst="roundRect">
+            <a:avLst/>
+          </a:prstGeom>
+          <a:solidFill>
+            <a:schemeClr val="accent5">
+              <a:lumMod val="40000"/>
+              <a:lumOff val="60000"/>
+            </a:schemeClr>
+          </a:solidFill>
+          <a:ln w="28575">
+            <a:solidFill>
+              <a:schemeClr val="accent1"/>
+            </a:solidFill>
+          </a:ln>
+        </p:spPr>
+        <p:txBody>
+          <a:bodyPr rot="0" spcFirstLastPara="0" vert="horz" wrap="square" lIns="91440" tIns="45720" rIns="91440" bIns="45720" numCol="1" spcCol="0" rtlCol="0" fromWordArt="0" anchor="ctr" anchorCtr="0" forceAA="0" compatLnSpc="1">
+            <a:prstTxWarp prst="textNoShape">
+              <a:avLst/>
+            </a:prstTxWarp>
+            <a:noAutofit/>
+          </a:bodyPr>
+          <a:lstStyle/>
+          <a:p>
+            <a:pPr algn="ctr">
+              <a:lnSpc>
+                <a:spcPct val="107000"/>
+              </a:lnSpc>
+              <a:spcAft>
+                <a:spcPts val="800"/>
+              </a:spcAft>
+            </a:pPr>
+            <a:r>
+              <a:rPr lang="en-IN" sz="1100" b="1">
+                <a:effectLst/>
+                <a:latin typeface="Trebuchet MS" panose="020B0603020202020204" pitchFamily="34" charset="0"/>
+                <a:ea typeface="Calibri" panose="020F0502020204030204" pitchFamily="34" charset="0"/>
+                <a:cs typeface="Mangal" panose="02040503050203030202" pitchFamily="18" charset="0"/>
+              </a:rPr>
+              <a:t>Companies</a:t>
+            </a:r>
+            <a:endParaRPr lang="en-IN" sz="1100">
+              <a:effectLst/>
+              <a:latin typeface="Calibri" panose="020F0502020204030204" pitchFamily="34" charset="0"/>
+              <a:ea typeface="Calibri" panose="020F0502020204030204" pitchFamily="34" charset="0"/>
+              <a:cs typeface="Mangal" panose="02040503050203030202" pitchFamily="18" charset="0"/>
+            </a:endParaRPr>
+          </a:p>
+        </p:txBody>
+      </p:sp>
+      <p:sp>
+        <p:nvSpPr>
+          <p:cNvPr id="4" name="Text Box 5">
+            <a:extLst>
+              <a:ext uri="{FF2B5EF4-FFF2-40B4-BE49-F238E27FC236}">
+                <a16:creationId xmlns:a16="http://schemas.microsoft.com/office/drawing/2014/main" id="{461FB643-BF9B-84D2-5423-203E1CED29BD}"/>
+              </a:ext>
+            </a:extLst>
+          </p:cNvPr>
+          <p:cNvSpPr txBox="1"/>
+          <p:nvPr/>
+        </p:nvSpPr>
+        <p:spPr>
+          <a:xfrm>
+            <a:off x="4290730" y="3733541"/>
+            <a:ext cx="1040765" cy="340995"/>
+          </a:xfrm>
+          <a:prstGeom prst="roundRect">
+            <a:avLst/>
+          </a:prstGeom>
+          <a:solidFill>
+            <a:schemeClr val="accent5">
+              <a:lumMod val="40000"/>
+              <a:lumOff val="60000"/>
+            </a:schemeClr>
+          </a:solidFill>
+          <a:ln w="28575">
+            <a:solidFill>
+              <a:schemeClr val="accent1"/>
+            </a:solidFill>
+          </a:ln>
+        </p:spPr>
+        <p:txBody>
+          <a:bodyPr rot="0" spcFirstLastPara="0" vert="horz" wrap="square" lIns="91440" tIns="45720" rIns="91440" bIns="45720" numCol="1" spcCol="0" rtlCol="0" fromWordArt="0" anchor="ctr" anchorCtr="0" forceAA="0" compatLnSpc="1">
+            <a:prstTxWarp prst="textNoShape">
+              <a:avLst/>
+            </a:prstTxWarp>
+            <a:noAutofit/>
+          </a:bodyPr>
+          <a:lstStyle/>
+          <a:p>
+            <a:pPr algn="ctr">
+              <a:lnSpc>
+                <a:spcPct val="107000"/>
+              </a:lnSpc>
+              <a:spcAft>
+                <a:spcPts val="800"/>
+              </a:spcAft>
+            </a:pPr>
+            <a:r>
+              <a:rPr lang="en-IN" sz="1100" b="1">
+                <a:effectLst/>
+                <a:latin typeface="Trebuchet MS" panose="020B0603020202020204" pitchFamily="34" charset="0"/>
+                <a:ea typeface="Calibri" panose="020F0502020204030204" pitchFamily="34" charset="0"/>
+                <a:cs typeface="Mangal" panose="02040503050203030202" pitchFamily="18" charset="0"/>
+              </a:rPr>
+              <a:t>News Feed</a:t>
+            </a:r>
+            <a:endParaRPr lang="en-IN" sz="1100">
+              <a:effectLst/>
+              <a:latin typeface="Calibri" panose="020F0502020204030204" pitchFamily="34" charset="0"/>
+              <a:ea typeface="Calibri" panose="020F0502020204030204" pitchFamily="34" charset="0"/>
+              <a:cs typeface="Mangal" panose="02040503050203030202" pitchFamily="18" charset="0"/>
+            </a:endParaRPr>
+          </a:p>
+        </p:txBody>
+      </p:sp>
+      <p:sp>
+        <p:nvSpPr>
+          <p:cNvPr id="5" name="Text Box 28">
+            <a:extLst>
+              <a:ext uri="{FF2B5EF4-FFF2-40B4-BE49-F238E27FC236}">
+                <a16:creationId xmlns:a16="http://schemas.microsoft.com/office/drawing/2014/main" id="{29BEA3B9-51DE-6A5C-68F4-D9D25D8EBB03}"/>
+              </a:ext>
+            </a:extLst>
+          </p:cNvPr>
+          <p:cNvSpPr txBox="1"/>
+          <p:nvPr/>
+        </p:nvSpPr>
+        <p:spPr>
+          <a:xfrm>
+            <a:off x="6634116" y="4500990"/>
+            <a:ext cx="1040765" cy="340995"/>
+          </a:xfrm>
+          <a:prstGeom prst="roundRect">
+            <a:avLst/>
+          </a:prstGeom>
+          <a:solidFill>
+            <a:schemeClr val="accent5">
+              <a:lumMod val="40000"/>
+              <a:lumOff val="60000"/>
+            </a:schemeClr>
+          </a:solidFill>
+          <a:ln w="28575">
+            <a:solidFill>
+              <a:schemeClr val="accent1"/>
+            </a:solidFill>
+          </a:ln>
+        </p:spPr>
+        <p:txBody>
+          <a:bodyPr rot="0" spcFirstLastPara="0" vert="horz" wrap="square" lIns="91440" tIns="45720" rIns="91440" bIns="45720" numCol="1" spcCol="0" rtlCol="0" fromWordArt="0" anchor="ctr" anchorCtr="0" forceAA="0" compatLnSpc="1">
+            <a:prstTxWarp prst="textNoShape">
+              <a:avLst/>
+            </a:prstTxWarp>
+            <a:noAutofit/>
+          </a:bodyPr>
+          <a:lstStyle/>
+          <a:p>
+            <a:pPr algn="ctr">
+              <a:lnSpc>
+                <a:spcPct val="107000"/>
+              </a:lnSpc>
+              <a:spcAft>
+                <a:spcPts val="800"/>
+              </a:spcAft>
+            </a:pPr>
+            <a:r>
+              <a:rPr lang="en-IN" sz="1100" b="1">
+                <a:effectLst/>
+                <a:latin typeface="Trebuchet MS" panose="020B0603020202020204" pitchFamily="34" charset="0"/>
+                <a:ea typeface="Calibri" panose="020F0502020204030204" pitchFamily="34" charset="0"/>
+                <a:cs typeface="Mangal" panose="02040503050203030202" pitchFamily="18" charset="0"/>
+              </a:rPr>
+              <a:t>Resources</a:t>
+            </a:r>
+            <a:endParaRPr lang="en-IN" sz="1100">
+              <a:effectLst/>
+              <a:latin typeface="Calibri" panose="020F0502020204030204" pitchFamily="34" charset="0"/>
+              <a:ea typeface="Calibri" panose="020F0502020204030204" pitchFamily="34" charset="0"/>
+              <a:cs typeface="Mangal" panose="02040503050203030202" pitchFamily="18" charset="0"/>
+            </a:endParaRPr>
+          </a:p>
+        </p:txBody>
+      </p:sp>
+      <p:sp>
+        <p:nvSpPr>
+          <p:cNvPr id="6" name="Text Box 29">
+            <a:extLst>
+              <a:ext uri="{FF2B5EF4-FFF2-40B4-BE49-F238E27FC236}">
+                <a16:creationId xmlns:a16="http://schemas.microsoft.com/office/drawing/2014/main" id="{BB29EDE8-4310-E530-2867-EDB4DEDD89BF}"/>
+              </a:ext>
+            </a:extLst>
+          </p:cNvPr>
+          <p:cNvSpPr txBox="1"/>
+          <p:nvPr/>
+        </p:nvSpPr>
+        <p:spPr>
+          <a:xfrm>
+            <a:off x="8661698" y="5060534"/>
+            <a:ext cx="1489710" cy="340995"/>
+          </a:xfrm>
+          <a:prstGeom prst="roundRect">
+            <a:avLst/>
+          </a:prstGeom>
+          <a:solidFill>
+            <a:schemeClr val="accent5">
+              <a:lumMod val="40000"/>
+              <a:lumOff val="60000"/>
+            </a:schemeClr>
+          </a:solidFill>
+          <a:ln w="28575">
+            <a:solidFill>
+              <a:schemeClr val="accent1"/>
+            </a:solidFill>
+          </a:ln>
+        </p:spPr>
+        <p:txBody>
+          <a:bodyPr rot="0" spcFirstLastPara="0" vert="horz" wrap="square" lIns="91440" tIns="45720" rIns="91440" bIns="45720" numCol="1" spcCol="0" rtlCol="0" fromWordArt="0" anchor="ctr" anchorCtr="0" forceAA="0" compatLnSpc="1">
+            <a:prstTxWarp prst="textNoShape">
+              <a:avLst/>
+            </a:prstTxWarp>
+            <a:noAutofit/>
+          </a:bodyPr>
+          <a:lstStyle/>
+          <a:p>
+            <a:pPr algn="ctr">
+              <a:lnSpc>
+                <a:spcPct val="107000"/>
+              </a:lnSpc>
+              <a:spcAft>
+                <a:spcPts val="800"/>
+              </a:spcAft>
+            </a:pPr>
+            <a:r>
+              <a:rPr lang="en-IN" sz="1100" b="1" dirty="0">
+                <a:effectLst/>
+                <a:latin typeface="Trebuchet MS" panose="020B0603020202020204" pitchFamily="34" charset="0"/>
+                <a:ea typeface="Calibri" panose="020F0502020204030204" pitchFamily="34" charset="0"/>
+                <a:cs typeface="Mangal" panose="02040503050203030202" pitchFamily="18" charset="0"/>
+              </a:rPr>
+              <a:t>T&amp;P Coordinators</a:t>
+            </a:r>
+            <a:endParaRPr lang="en-IN" sz="1100" dirty="0">
+              <a:effectLst/>
+              <a:latin typeface="Calibri" panose="020F0502020204030204" pitchFamily="34" charset="0"/>
+              <a:ea typeface="Calibri" panose="020F0502020204030204" pitchFamily="34" charset="0"/>
+              <a:cs typeface="Mangal" panose="02040503050203030202" pitchFamily="18" charset="0"/>
+            </a:endParaRPr>
+          </a:p>
+        </p:txBody>
+      </p:sp>
+      <p:sp>
+        <p:nvSpPr>
+          <p:cNvPr id="7" name="Text Box 32">
+            <a:extLst>
+              <a:ext uri="{FF2B5EF4-FFF2-40B4-BE49-F238E27FC236}">
+                <a16:creationId xmlns:a16="http://schemas.microsoft.com/office/drawing/2014/main" id="{0FE30B46-63FF-4250-FD0E-EE73F55DAC90}"/>
+              </a:ext>
+            </a:extLst>
+          </p:cNvPr>
+          <p:cNvSpPr txBox="1"/>
+          <p:nvPr/>
+        </p:nvSpPr>
+        <p:spPr>
+          <a:xfrm>
+            <a:off x="11185725" y="4500990"/>
+            <a:ext cx="933450" cy="340995"/>
+          </a:xfrm>
+          <a:prstGeom prst="roundRect">
+            <a:avLst/>
+          </a:prstGeom>
+          <a:solidFill>
+            <a:schemeClr val="accent5">
+              <a:lumMod val="40000"/>
+              <a:lumOff val="60000"/>
+            </a:schemeClr>
+          </a:solidFill>
+          <a:ln w="28575">
+            <a:solidFill>
+              <a:schemeClr val="accent1"/>
+            </a:solidFill>
+          </a:ln>
+        </p:spPr>
+        <p:txBody>
+          <a:bodyPr rot="0" spcFirstLastPara="0" vert="horz" wrap="square" lIns="91440" tIns="45720" rIns="91440" bIns="45720" numCol="1" spcCol="0" rtlCol="0" fromWordArt="0" anchor="ctr" anchorCtr="0" forceAA="0" compatLnSpc="1">
+            <a:prstTxWarp prst="textNoShape">
+              <a:avLst/>
+            </a:prstTxWarp>
+            <a:noAutofit/>
+          </a:bodyPr>
+          <a:lstStyle/>
+          <a:p>
+            <a:pPr algn="ctr">
+              <a:lnSpc>
+                <a:spcPct val="107000"/>
+              </a:lnSpc>
+              <a:spcAft>
+                <a:spcPts val="800"/>
+              </a:spcAft>
+            </a:pPr>
+            <a:r>
+              <a:rPr lang="en-IN" sz="1100" b="1">
+                <a:effectLst/>
+                <a:latin typeface="Trebuchet MS" panose="020B0603020202020204" pitchFamily="34" charset="0"/>
+                <a:ea typeface="Calibri" panose="020F0502020204030204" pitchFamily="34" charset="0"/>
+                <a:cs typeface="Mangal" panose="02040503050203030202" pitchFamily="18" charset="0"/>
+              </a:rPr>
+              <a:t>Students</a:t>
+            </a:r>
+            <a:endParaRPr lang="en-IN" sz="1100">
+              <a:effectLst/>
+              <a:latin typeface="Calibri" panose="020F0502020204030204" pitchFamily="34" charset="0"/>
+              <a:ea typeface="Calibri" panose="020F0502020204030204" pitchFamily="34" charset="0"/>
+              <a:cs typeface="Mangal" panose="02040503050203030202" pitchFamily="18" charset="0"/>
+            </a:endParaRPr>
+          </a:p>
+        </p:txBody>
+      </p:sp>
+      <p:sp>
+        <p:nvSpPr>
+          <p:cNvPr id="8" name="Text Box 34">
+            <a:extLst>
+              <a:ext uri="{FF2B5EF4-FFF2-40B4-BE49-F238E27FC236}">
+                <a16:creationId xmlns:a16="http://schemas.microsoft.com/office/drawing/2014/main" id="{6D578A46-66F0-2831-0333-7CD63E4E57C3}"/>
+              </a:ext>
+            </a:extLst>
+          </p:cNvPr>
+          <p:cNvSpPr txBox="1"/>
+          <p:nvPr/>
+        </p:nvSpPr>
+        <p:spPr>
+          <a:xfrm>
+            <a:off x="12691425" y="3728645"/>
+            <a:ext cx="2038350" cy="340995"/>
+          </a:xfrm>
+          <a:prstGeom prst="roundRect">
+            <a:avLst/>
+          </a:prstGeom>
+          <a:solidFill>
+            <a:schemeClr val="accent5">
+              <a:lumMod val="40000"/>
+              <a:lumOff val="60000"/>
+            </a:schemeClr>
+          </a:solidFill>
+          <a:ln w="28575">
+            <a:solidFill>
+              <a:schemeClr val="accent1"/>
+            </a:solidFill>
+          </a:ln>
+        </p:spPr>
+        <p:txBody>
+          <a:bodyPr rot="0" spcFirstLastPara="0" vert="horz" wrap="square" lIns="91440" tIns="45720" rIns="91440" bIns="45720" numCol="1" spcCol="0" rtlCol="0" fromWordArt="0" anchor="ctr" anchorCtr="0" forceAA="0" compatLnSpc="1">
+            <a:prstTxWarp prst="textNoShape">
+              <a:avLst/>
+            </a:prstTxWarp>
+            <a:noAutofit/>
+          </a:bodyPr>
+          <a:lstStyle/>
+          <a:p>
+            <a:pPr algn="ctr">
+              <a:lnSpc>
+                <a:spcPct val="107000"/>
+              </a:lnSpc>
+              <a:spcAft>
+                <a:spcPts val="800"/>
+              </a:spcAft>
+            </a:pPr>
+            <a:r>
+              <a:rPr lang="en-IN" sz="1100" b="1">
+                <a:effectLst/>
+                <a:latin typeface="Trebuchet MS" panose="020B0603020202020204" pitchFamily="34" charset="0"/>
+                <a:ea typeface="Calibri" panose="020F0502020204030204" pitchFamily="34" charset="0"/>
+                <a:cs typeface="Mangal" panose="02040503050203030202" pitchFamily="18" charset="0"/>
+              </a:rPr>
+              <a:t>Off Campus Opportunities</a:t>
+            </a:r>
+            <a:endParaRPr lang="en-IN" sz="1100">
+              <a:effectLst/>
+              <a:latin typeface="Calibri" panose="020F0502020204030204" pitchFamily="34" charset="0"/>
+              <a:ea typeface="Calibri" panose="020F0502020204030204" pitchFamily="34" charset="0"/>
+              <a:cs typeface="Mangal" panose="02040503050203030202" pitchFamily="18" charset="0"/>
+            </a:endParaRPr>
+          </a:p>
+        </p:txBody>
+      </p:sp>
+      <p:sp>
+        <p:nvSpPr>
+          <p:cNvPr id="9" name="Text Box 36">
+            <a:extLst>
+              <a:ext uri="{FF2B5EF4-FFF2-40B4-BE49-F238E27FC236}">
+                <a16:creationId xmlns:a16="http://schemas.microsoft.com/office/drawing/2014/main" id="{E6E7C023-C654-46C4-1A2C-4532DC99ADCF}"/>
+              </a:ext>
+            </a:extLst>
+          </p:cNvPr>
+          <p:cNvSpPr txBox="1"/>
+          <p:nvPr/>
+        </p:nvSpPr>
+        <p:spPr>
+          <a:xfrm>
+            <a:off x="15431294" y="2876743"/>
+            <a:ext cx="803910" cy="340995"/>
+          </a:xfrm>
+          <a:prstGeom prst="roundRect">
+            <a:avLst/>
+          </a:prstGeom>
+          <a:solidFill>
+            <a:schemeClr val="accent5">
+              <a:lumMod val="40000"/>
+              <a:lumOff val="60000"/>
+            </a:schemeClr>
+          </a:solidFill>
+          <a:ln w="28575">
+            <a:solidFill>
+              <a:schemeClr val="accent1"/>
+            </a:solidFill>
+          </a:ln>
+        </p:spPr>
+        <p:txBody>
+          <a:bodyPr rot="0" spcFirstLastPara="0" vert="horz" wrap="square" lIns="91440" tIns="45720" rIns="91440" bIns="45720" numCol="1" spcCol="0" rtlCol="0" fromWordArt="0" anchor="ctr" anchorCtr="0" forceAA="0" compatLnSpc="1">
+            <a:prstTxWarp prst="textNoShape">
+              <a:avLst/>
+            </a:prstTxWarp>
+            <a:noAutofit/>
+          </a:bodyPr>
+          <a:lstStyle/>
+          <a:p>
+            <a:pPr algn="ctr">
+              <a:lnSpc>
+                <a:spcPct val="107000"/>
+              </a:lnSpc>
+              <a:spcAft>
+                <a:spcPts val="800"/>
+              </a:spcAft>
+            </a:pPr>
+            <a:r>
+              <a:rPr lang="en-IN" sz="1100" b="1">
+                <a:effectLst/>
+                <a:latin typeface="Trebuchet MS" panose="020B0603020202020204" pitchFamily="34" charset="0"/>
+                <a:ea typeface="Calibri" panose="020F0502020204030204" pitchFamily="34" charset="0"/>
+                <a:cs typeface="Mangal" panose="02040503050203030202" pitchFamily="18" charset="0"/>
+              </a:rPr>
+              <a:t>Tickets</a:t>
+            </a:r>
+            <a:endParaRPr lang="en-IN" sz="1100">
+              <a:effectLst/>
+              <a:latin typeface="Calibri" panose="020F0502020204030204" pitchFamily="34" charset="0"/>
+              <a:ea typeface="Calibri" panose="020F0502020204030204" pitchFamily="34" charset="0"/>
+              <a:cs typeface="Mangal" panose="02040503050203030202" pitchFamily="18" charset="0"/>
+            </a:endParaRPr>
+          </a:p>
+        </p:txBody>
+      </p:sp>
+      <p:sp>
+        <p:nvSpPr>
+          <p:cNvPr id="10" name="Text Box 3">
+            <a:extLst>
+              <a:ext uri="{FF2B5EF4-FFF2-40B4-BE49-F238E27FC236}">
+                <a16:creationId xmlns:a16="http://schemas.microsoft.com/office/drawing/2014/main" id="{A70454EE-4F9F-D596-D10B-7761AC62BA45}"/>
+              </a:ext>
+            </a:extLst>
+          </p:cNvPr>
+          <p:cNvSpPr txBox="1"/>
+          <p:nvPr/>
+        </p:nvSpPr>
+        <p:spPr>
+          <a:xfrm>
+            <a:off x="8778855" y="2679589"/>
+            <a:ext cx="1255395" cy="340995"/>
+          </a:xfrm>
+          <a:prstGeom prst="roundRect">
+            <a:avLst/>
+          </a:prstGeom>
+          <a:solidFill>
+            <a:schemeClr val="accent2">
+              <a:lumMod val="20000"/>
+              <a:lumOff val="80000"/>
+            </a:schemeClr>
+          </a:solidFill>
+          <a:ln w="28575">
+            <a:solidFill>
+              <a:schemeClr val="accent2"/>
+            </a:solidFill>
+          </a:ln>
+        </p:spPr>
+        <p:txBody>
+          <a:bodyPr rot="0" spcFirstLastPara="0" vert="horz" wrap="square" lIns="91440" tIns="45720" rIns="91440" bIns="45720" numCol="1" spcCol="0" rtlCol="0" fromWordArt="0" anchor="ctr" anchorCtr="0" forceAA="0" compatLnSpc="1">
+            <a:prstTxWarp prst="textNoShape">
+              <a:avLst/>
+            </a:prstTxWarp>
+            <a:noAutofit/>
+          </a:bodyPr>
+          <a:lstStyle/>
+          <a:p>
+            <a:pPr algn="ctr">
+              <a:lnSpc>
+                <a:spcPct val="107000"/>
+              </a:lnSpc>
+              <a:spcAft>
+                <a:spcPts val="800"/>
+              </a:spcAft>
+            </a:pPr>
+            <a:r>
+              <a:rPr lang="en-IN" sz="1100" b="1">
+                <a:effectLst/>
+                <a:latin typeface="Trebuchet MS" panose="020B0603020202020204" pitchFamily="34" charset="0"/>
+                <a:ea typeface="Calibri" panose="020F0502020204030204" pitchFamily="34" charset="0"/>
+                <a:cs typeface="Mangal" panose="02040503050203030202" pitchFamily="18" charset="0"/>
+              </a:rPr>
+              <a:t>Menu Screen</a:t>
+            </a:r>
+            <a:endParaRPr lang="en-IN" sz="1100">
+              <a:effectLst/>
+              <a:latin typeface="Calibri" panose="020F0502020204030204" pitchFamily="34" charset="0"/>
+              <a:ea typeface="Calibri" panose="020F0502020204030204" pitchFamily="34" charset="0"/>
+              <a:cs typeface="Mangal" panose="02040503050203030202" pitchFamily="18" charset="0"/>
+            </a:endParaRPr>
+          </a:p>
+        </p:txBody>
+      </p:sp>
+      <p:sp>
+        <p:nvSpPr>
+          <p:cNvPr id="11" name="Text Box 16">
+            <a:extLst>
+              <a:ext uri="{FF2B5EF4-FFF2-40B4-BE49-F238E27FC236}">
+                <a16:creationId xmlns:a16="http://schemas.microsoft.com/office/drawing/2014/main" id="{79F563C7-7E88-EE35-129F-A86B17CE6D0A}"/>
+              </a:ext>
+            </a:extLst>
+          </p:cNvPr>
+          <p:cNvSpPr txBox="1"/>
+          <p:nvPr/>
+        </p:nvSpPr>
+        <p:spPr>
+          <a:xfrm>
+            <a:off x="9577117" y="1353954"/>
+            <a:ext cx="1858010" cy="507365"/>
+          </a:xfrm>
+          <a:prstGeom prst="snip1Rect">
+            <a:avLst/>
+          </a:prstGeom>
+          <a:solidFill>
+            <a:schemeClr val="bg1"/>
+          </a:solidFill>
+          <a:ln w="28575">
+            <a:solidFill>
+              <a:srgbClr val="7030A0"/>
+            </a:solidFill>
+          </a:ln>
+        </p:spPr>
+        <p:txBody>
+          <a:bodyPr rot="0" spcFirstLastPara="0" vert="horz" wrap="square" lIns="91440" tIns="45720" rIns="91440" bIns="45720" numCol="1" spcCol="0" rtlCol="0" fromWordArt="0" anchor="ctr" anchorCtr="0" forceAA="0" compatLnSpc="1">
+            <a:prstTxWarp prst="textNoShape">
+              <a:avLst/>
+            </a:prstTxWarp>
+            <a:noAutofit/>
+          </a:bodyPr>
+          <a:lstStyle/>
+          <a:p>
+            <a:pPr algn="ctr">
+              <a:lnSpc>
+                <a:spcPct val="107000"/>
+              </a:lnSpc>
+              <a:spcAft>
+                <a:spcPts val="800"/>
+              </a:spcAft>
+            </a:pPr>
+            <a:r>
+              <a:rPr lang="en-IN" sz="1000" b="1">
+                <a:effectLst/>
+                <a:latin typeface="Trebuchet MS" panose="020B0603020202020204" pitchFamily="34" charset="0"/>
+                <a:ea typeface="Calibri" panose="020F0502020204030204" pitchFamily="34" charset="0"/>
+                <a:cs typeface="Mangal" panose="02040503050203030202" pitchFamily="18" charset="0"/>
+              </a:rPr>
+              <a:t>Logged Admin Details Widget</a:t>
+            </a:r>
+            <a:endParaRPr lang="en-IN" sz="1100">
+              <a:effectLst/>
+              <a:latin typeface="Calibri" panose="020F0502020204030204" pitchFamily="34" charset="0"/>
+              <a:ea typeface="Calibri" panose="020F0502020204030204" pitchFamily="34" charset="0"/>
+              <a:cs typeface="Mangal" panose="02040503050203030202" pitchFamily="18" charset="0"/>
+            </a:endParaRPr>
+          </a:p>
+        </p:txBody>
+      </p:sp>
+      <p:sp>
+        <p:nvSpPr>
+          <p:cNvPr id="12" name="Text Box 13">
+            <a:extLst>
+              <a:ext uri="{FF2B5EF4-FFF2-40B4-BE49-F238E27FC236}">
+                <a16:creationId xmlns:a16="http://schemas.microsoft.com/office/drawing/2014/main" id="{8077E909-FC56-2C3B-D374-02E215482A8A}"/>
+              </a:ext>
+            </a:extLst>
+          </p:cNvPr>
+          <p:cNvSpPr txBox="1"/>
+          <p:nvPr/>
+        </p:nvSpPr>
+        <p:spPr>
+          <a:xfrm>
+            <a:off x="12691425" y="1603054"/>
+            <a:ext cx="857250" cy="375285"/>
+          </a:xfrm>
+          <a:prstGeom prst="roundRect">
+            <a:avLst/>
+          </a:prstGeom>
+          <a:solidFill>
+            <a:srgbClr val="F5D8D5"/>
+          </a:solidFill>
+          <a:ln w="28575">
+            <a:solidFill>
+              <a:srgbClr val="C00000"/>
+            </a:solidFill>
+          </a:ln>
+        </p:spPr>
+        <p:txBody>
+          <a:bodyPr rot="0" spcFirstLastPara="0" vert="horz" wrap="square" lIns="91440" tIns="45720" rIns="91440" bIns="45720" numCol="1" spcCol="0" rtlCol="0" fromWordArt="0" anchor="ctr" anchorCtr="0" forceAA="0" compatLnSpc="1">
+            <a:prstTxWarp prst="textNoShape">
+              <a:avLst/>
+            </a:prstTxWarp>
+            <a:noAutofit/>
+          </a:bodyPr>
+          <a:lstStyle/>
+          <a:p>
+            <a:pPr algn="ctr">
+              <a:lnSpc>
+                <a:spcPct val="107000"/>
+              </a:lnSpc>
+              <a:spcAft>
+                <a:spcPts val="800"/>
+              </a:spcAft>
+            </a:pPr>
+            <a:r>
+              <a:rPr lang="en-IN" sz="1100" b="1">
+                <a:effectLst/>
+                <a:latin typeface="Trebuchet MS" panose="020B0603020202020204" pitchFamily="34" charset="0"/>
+                <a:ea typeface="Calibri" panose="020F0502020204030204" pitchFamily="34" charset="0"/>
+                <a:cs typeface="Mangal" panose="02040503050203030202" pitchFamily="18" charset="0"/>
+              </a:rPr>
+              <a:t>Logout</a:t>
+            </a:r>
+            <a:endParaRPr lang="en-IN" sz="1100">
+              <a:effectLst/>
+              <a:latin typeface="Calibri" panose="020F0502020204030204" pitchFamily="34" charset="0"/>
+              <a:ea typeface="Calibri" panose="020F0502020204030204" pitchFamily="34" charset="0"/>
+              <a:cs typeface="Mangal" panose="02040503050203030202" pitchFamily="18" charset="0"/>
+            </a:endParaRPr>
+          </a:p>
+        </p:txBody>
+      </p:sp>
+      <p:sp>
+        <p:nvSpPr>
+          <p:cNvPr id="13" name="Text Box 8">
+            <a:extLst>
+              <a:ext uri="{FF2B5EF4-FFF2-40B4-BE49-F238E27FC236}">
+                <a16:creationId xmlns:a16="http://schemas.microsoft.com/office/drawing/2014/main" id="{4CBDE098-12DD-23A9-4F03-9097FF8A2002}"/>
+              </a:ext>
+            </a:extLst>
+          </p:cNvPr>
+          <p:cNvSpPr txBox="1"/>
+          <p:nvPr/>
+        </p:nvSpPr>
+        <p:spPr>
+          <a:xfrm>
+            <a:off x="1511777" y="3882970"/>
+            <a:ext cx="1982470" cy="508635"/>
+          </a:xfrm>
+          <a:prstGeom prst="roundRect">
+            <a:avLst/>
+          </a:prstGeom>
+          <a:solidFill>
+            <a:schemeClr val="accent6">
+              <a:lumMod val="20000"/>
+              <a:lumOff val="80000"/>
+            </a:schemeClr>
+          </a:solidFill>
+          <a:ln w="28575">
+            <a:solidFill>
+              <a:schemeClr val="accent6"/>
+            </a:solidFill>
+          </a:ln>
+        </p:spPr>
+        <p:txBody>
+          <a:bodyPr rot="0" spcFirstLastPara="0" vert="horz" wrap="square" lIns="91440" tIns="45720" rIns="91440" bIns="45720" numCol="1" spcCol="0" rtlCol="0" fromWordArt="0" anchor="ctr" anchorCtr="0" forceAA="0" compatLnSpc="1">
+            <a:prstTxWarp prst="textNoShape">
+              <a:avLst/>
+            </a:prstTxWarp>
+            <a:noAutofit/>
+          </a:bodyPr>
+          <a:lstStyle/>
+          <a:p>
+            <a:pPr algn="ctr">
+              <a:lnSpc>
+                <a:spcPct val="107000"/>
+              </a:lnSpc>
+              <a:spcAft>
+                <a:spcPts val="800"/>
+              </a:spcAft>
+            </a:pPr>
+            <a:r>
+              <a:rPr lang="en-IN" sz="1100" b="1">
+                <a:effectLst/>
+                <a:latin typeface="Trebuchet MS" panose="020B0603020202020204" pitchFamily="34" charset="0"/>
+                <a:ea typeface="Calibri" panose="020F0502020204030204" pitchFamily="34" charset="0"/>
+                <a:cs typeface="Mangal" panose="02040503050203030202" pitchFamily="18" charset="0"/>
+              </a:rPr>
+              <a:t>On Campus</a:t>
+            </a:r>
+            <a:r>
+              <a:rPr lang="en-IN" sz="1100">
+                <a:effectLst/>
+                <a:latin typeface="Calibri" panose="020F0502020204030204" pitchFamily="34" charset="0"/>
+                <a:ea typeface="Calibri" panose="020F0502020204030204" pitchFamily="34" charset="0"/>
+                <a:cs typeface="Mangal" panose="02040503050203030202" pitchFamily="18" charset="0"/>
+              </a:rPr>
+              <a:t> </a:t>
+            </a:r>
+            <a:r>
+              <a:rPr lang="en-IN" sz="1100" b="1">
+                <a:effectLst/>
+                <a:latin typeface="Trebuchet MS" panose="020B0603020202020204" pitchFamily="34" charset="0"/>
+                <a:ea typeface="Calibri" panose="020F0502020204030204" pitchFamily="34" charset="0"/>
+                <a:cs typeface="Mangal" panose="02040503050203030202" pitchFamily="18" charset="0"/>
+              </a:rPr>
+              <a:t>Opportunities Screen</a:t>
+            </a:r>
+            <a:endParaRPr lang="en-IN" sz="1100">
+              <a:effectLst/>
+              <a:latin typeface="Calibri" panose="020F0502020204030204" pitchFamily="34" charset="0"/>
+              <a:ea typeface="Calibri" panose="020F0502020204030204" pitchFamily="34" charset="0"/>
+              <a:cs typeface="Mangal" panose="02040503050203030202" pitchFamily="18" charset="0"/>
+            </a:endParaRPr>
+          </a:p>
+        </p:txBody>
+      </p:sp>
+      <p:sp>
+        <p:nvSpPr>
+          <p:cNvPr id="14" name="Text Box 9">
+            <a:extLst>
+              <a:ext uri="{FF2B5EF4-FFF2-40B4-BE49-F238E27FC236}">
+                <a16:creationId xmlns:a16="http://schemas.microsoft.com/office/drawing/2014/main" id="{71AC5FE4-45BB-87F7-0255-90639B2933E6}"/>
+              </a:ext>
+            </a:extLst>
+          </p:cNvPr>
+          <p:cNvSpPr txBox="1"/>
+          <p:nvPr/>
+        </p:nvSpPr>
+        <p:spPr>
+          <a:xfrm>
+            <a:off x="1511777" y="4627962"/>
+            <a:ext cx="1982470" cy="537210"/>
+          </a:xfrm>
+          <a:prstGeom prst="roundRect">
+            <a:avLst/>
+          </a:prstGeom>
+          <a:solidFill>
+            <a:schemeClr val="accent6">
+              <a:lumMod val="20000"/>
+              <a:lumOff val="80000"/>
+            </a:schemeClr>
+          </a:solidFill>
+          <a:ln w="28575">
+            <a:solidFill>
+              <a:schemeClr val="accent6"/>
+            </a:solidFill>
+          </a:ln>
+        </p:spPr>
+        <p:txBody>
+          <a:bodyPr rot="0" spcFirstLastPara="0" vert="horz" wrap="square" lIns="91440" tIns="45720" rIns="91440" bIns="45720" numCol="1" spcCol="0" rtlCol="0" fromWordArt="0" anchor="ctr" anchorCtr="0" forceAA="0" compatLnSpc="1">
+            <a:prstTxWarp prst="textNoShape">
+              <a:avLst/>
+            </a:prstTxWarp>
+            <a:noAutofit/>
+          </a:bodyPr>
+          <a:lstStyle/>
+          <a:p>
+            <a:pPr algn="ctr">
+              <a:lnSpc>
+                <a:spcPct val="107000"/>
+              </a:lnSpc>
+              <a:spcAft>
+                <a:spcPts val="800"/>
+              </a:spcAft>
+            </a:pPr>
+            <a:r>
+              <a:rPr lang="en-IN" sz="1100" b="1">
+                <a:effectLst/>
+                <a:latin typeface="Trebuchet MS" panose="020B0603020202020204" pitchFamily="34" charset="0"/>
+                <a:ea typeface="Calibri" panose="020F0502020204030204" pitchFamily="34" charset="0"/>
+                <a:cs typeface="Mangal" panose="02040503050203030202" pitchFamily="18" charset="0"/>
+              </a:rPr>
+              <a:t>Off Campus Opportunities</a:t>
+            </a:r>
+            <a:br>
+              <a:rPr lang="en-IN" sz="1100" b="1">
+                <a:effectLst/>
+                <a:latin typeface="Trebuchet MS" panose="020B0603020202020204" pitchFamily="34" charset="0"/>
+                <a:ea typeface="Calibri" panose="020F0502020204030204" pitchFamily="34" charset="0"/>
+                <a:cs typeface="Mangal" panose="02040503050203030202" pitchFamily="18" charset="0"/>
+              </a:rPr>
+            </a:br>
+            <a:r>
+              <a:rPr lang="en-IN" sz="1100" b="1">
+                <a:effectLst/>
+                <a:latin typeface="Trebuchet MS" panose="020B0603020202020204" pitchFamily="34" charset="0"/>
+                <a:ea typeface="Calibri" panose="020F0502020204030204" pitchFamily="34" charset="0"/>
+                <a:cs typeface="Mangal" panose="02040503050203030202" pitchFamily="18" charset="0"/>
+              </a:rPr>
+              <a:t>Screen</a:t>
+            </a:r>
+            <a:endParaRPr lang="en-IN" sz="1100">
+              <a:effectLst/>
+              <a:latin typeface="Calibri" panose="020F0502020204030204" pitchFamily="34" charset="0"/>
+              <a:ea typeface="Calibri" panose="020F0502020204030204" pitchFamily="34" charset="0"/>
+              <a:cs typeface="Mangal" panose="02040503050203030202" pitchFamily="18" charset="0"/>
+            </a:endParaRPr>
+          </a:p>
+        </p:txBody>
+      </p:sp>
+      <p:sp>
+        <p:nvSpPr>
+          <p:cNvPr id="15" name="Text Box 11">
+            <a:extLst>
+              <a:ext uri="{FF2B5EF4-FFF2-40B4-BE49-F238E27FC236}">
+                <a16:creationId xmlns:a16="http://schemas.microsoft.com/office/drawing/2014/main" id="{9732E070-2110-5E75-F31A-953F1CB2D3E9}"/>
+              </a:ext>
+            </a:extLst>
+          </p:cNvPr>
+          <p:cNvSpPr txBox="1"/>
+          <p:nvPr/>
+        </p:nvSpPr>
+        <p:spPr>
+          <a:xfrm>
+            <a:off x="3971007" y="6262137"/>
+            <a:ext cx="1680210" cy="392430"/>
+          </a:xfrm>
+          <a:prstGeom prst="snip1Rect">
+            <a:avLst/>
+          </a:prstGeom>
+          <a:solidFill>
+            <a:schemeClr val="bg1"/>
+          </a:solidFill>
+          <a:ln w="28575">
+            <a:solidFill>
+              <a:srgbClr val="7030A0"/>
+            </a:solidFill>
+          </a:ln>
+        </p:spPr>
+        <p:txBody>
+          <a:bodyPr rot="0" spcFirstLastPara="0" vert="horz" wrap="square" lIns="91440" tIns="45720" rIns="91440" bIns="45720" numCol="1" spcCol="0" rtlCol="0" fromWordArt="0" anchor="ctr" anchorCtr="0" forceAA="0" compatLnSpc="1">
+            <a:prstTxWarp prst="textNoShape">
+              <a:avLst/>
+            </a:prstTxWarp>
+            <a:noAutofit/>
+          </a:bodyPr>
+          <a:lstStyle/>
+          <a:p>
+            <a:pPr>
+              <a:lnSpc>
+                <a:spcPct val="107000"/>
+              </a:lnSpc>
+              <a:spcAft>
+                <a:spcPts val="800"/>
+              </a:spcAft>
+            </a:pPr>
+            <a:r>
+              <a:rPr lang="en-IN" sz="1000" b="1">
+                <a:effectLst/>
+                <a:latin typeface="Trebuchet MS" panose="020B0603020202020204" pitchFamily="34" charset="0"/>
+                <a:ea typeface="Calibri" panose="020F0502020204030204" pitchFamily="34" charset="0"/>
+                <a:cs typeface="Mangal" panose="02040503050203030202" pitchFamily="18" charset="0"/>
+              </a:rPr>
+              <a:t>View poll/post Statistics</a:t>
+            </a:r>
+            <a:endParaRPr lang="en-IN" sz="1100">
+              <a:effectLst/>
+              <a:latin typeface="Calibri" panose="020F0502020204030204" pitchFamily="34" charset="0"/>
+              <a:ea typeface="Calibri" panose="020F0502020204030204" pitchFamily="34" charset="0"/>
+              <a:cs typeface="Mangal" panose="02040503050203030202" pitchFamily="18" charset="0"/>
+            </a:endParaRPr>
+          </a:p>
+        </p:txBody>
+      </p:sp>
+      <p:sp>
+        <p:nvSpPr>
+          <p:cNvPr id="16" name="Text Box 14">
+            <a:extLst>
+              <a:ext uri="{FF2B5EF4-FFF2-40B4-BE49-F238E27FC236}">
+                <a16:creationId xmlns:a16="http://schemas.microsoft.com/office/drawing/2014/main" id="{943E9790-3BB0-B18B-14BA-ECC0D45C6A50}"/>
+              </a:ext>
+            </a:extLst>
+          </p:cNvPr>
+          <p:cNvSpPr txBox="1"/>
+          <p:nvPr/>
+        </p:nvSpPr>
+        <p:spPr>
+          <a:xfrm>
+            <a:off x="1491774" y="5401529"/>
+            <a:ext cx="1982470" cy="537210"/>
+          </a:xfrm>
+          <a:prstGeom prst="roundRect">
+            <a:avLst/>
+          </a:prstGeom>
+          <a:solidFill>
+            <a:schemeClr val="accent6">
+              <a:lumMod val="20000"/>
+              <a:lumOff val="80000"/>
+            </a:schemeClr>
+          </a:solidFill>
+          <a:ln w="28575">
+            <a:solidFill>
+              <a:schemeClr val="accent6"/>
+            </a:solidFill>
+          </a:ln>
+        </p:spPr>
+        <p:txBody>
+          <a:bodyPr rot="0" spcFirstLastPara="0" vert="horz" wrap="square" lIns="91440" tIns="45720" rIns="91440" bIns="45720" numCol="1" spcCol="0" rtlCol="0" fromWordArt="0" anchor="ctr" anchorCtr="0" forceAA="0" compatLnSpc="1">
+            <a:prstTxWarp prst="textNoShape">
+              <a:avLst/>
+            </a:prstTxWarp>
+            <a:noAutofit/>
+          </a:bodyPr>
+          <a:lstStyle/>
+          <a:p>
+            <a:pPr algn="ctr">
+              <a:lnSpc>
+                <a:spcPct val="107000"/>
+              </a:lnSpc>
+              <a:spcAft>
+                <a:spcPts val="800"/>
+              </a:spcAft>
+            </a:pPr>
+            <a:r>
+              <a:rPr lang="en-IN" sz="1100" b="1">
+                <a:effectLst/>
+                <a:latin typeface="Trebuchet MS" panose="020B0603020202020204" pitchFamily="34" charset="0"/>
+                <a:ea typeface="Calibri" panose="020F0502020204030204" pitchFamily="34" charset="0"/>
+                <a:cs typeface="Mangal" panose="02040503050203030202" pitchFamily="18" charset="0"/>
+              </a:rPr>
+              <a:t>Create/Edit On Campus Opportunity Form</a:t>
+            </a:r>
+            <a:endParaRPr lang="en-IN" sz="1100">
+              <a:effectLst/>
+              <a:latin typeface="Calibri" panose="020F0502020204030204" pitchFamily="34" charset="0"/>
+              <a:ea typeface="Calibri" panose="020F0502020204030204" pitchFamily="34" charset="0"/>
+              <a:cs typeface="Mangal" panose="02040503050203030202" pitchFamily="18" charset="0"/>
+            </a:endParaRPr>
+          </a:p>
+        </p:txBody>
+      </p:sp>
+      <p:sp>
+        <p:nvSpPr>
+          <p:cNvPr id="17" name="Text Box 18">
+            <a:extLst>
+              <a:ext uri="{FF2B5EF4-FFF2-40B4-BE49-F238E27FC236}">
+                <a16:creationId xmlns:a16="http://schemas.microsoft.com/office/drawing/2014/main" id="{6798B69D-070D-F2B8-1F8F-53B07E020383}"/>
+              </a:ext>
+            </a:extLst>
+          </p:cNvPr>
+          <p:cNvSpPr txBox="1"/>
+          <p:nvPr/>
+        </p:nvSpPr>
+        <p:spPr>
+          <a:xfrm>
+            <a:off x="1511777" y="6175096"/>
+            <a:ext cx="1982470" cy="537210"/>
+          </a:xfrm>
+          <a:prstGeom prst="roundRect">
+            <a:avLst/>
+          </a:prstGeom>
+          <a:solidFill>
+            <a:schemeClr val="accent6">
+              <a:lumMod val="20000"/>
+              <a:lumOff val="80000"/>
+            </a:schemeClr>
+          </a:solidFill>
+          <a:ln w="28575">
+            <a:solidFill>
+              <a:schemeClr val="accent6"/>
+            </a:solidFill>
+          </a:ln>
+        </p:spPr>
+        <p:txBody>
+          <a:bodyPr rot="0" spcFirstLastPara="0" vert="horz" wrap="square" lIns="91440" tIns="45720" rIns="91440" bIns="45720" numCol="1" spcCol="0" rtlCol="0" fromWordArt="0" anchor="ctr" anchorCtr="0" forceAA="0" compatLnSpc="1">
+            <a:prstTxWarp prst="textNoShape">
+              <a:avLst/>
+            </a:prstTxWarp>
+            <a:noAutofit/>
+          </a:bodyPr>
+          <a:lstStyle/>
+          <a:p>
+            <a:pPr algn="ctr">
+              <a:lnSpc>
+                <a:spcPct val="107000"/>
+              </a:lnSpc>
+              <a:spcAft>
+                <a:spcPts val="800"/>
+              </a:spcAft>
+            </a:pPr>
+            <a:r>
+              <a:rPr lang="en-IN" sz="1100" b="1">
+                <a:effectLst/>
+                <a:latin typeface="Trebuchet MS" panose="020B0603020202020204" pitchFamily="34" charset="0"/>
+                <a:ea typeface="Calibri" panose="020F0502020204030204" pitchFamily="34" charset="0"/>
+                <a:cs typeface="Mangal" panose="02040503050203030202" pitchFamily="18" charset="0"/>
+              </a:rPr>
+              <a:t>Create/Edit Off Campus Opportunity Form</a:t>
+            </a:r>
+            <a:endParaRPr lang="en-IN" sz="1100">
+              <a:effectLst/>
+              <a:latin typeface="Calibri" panose="020F0502020204030204" pitchFamily="34" charset="0"/>
+              <a:ea typeface="Calibri" panose="020F0502020204030204" pitchFamily="34" charset="0"/>
+              <a:cs typeface="Mangal" panose="02040503050203030202" pitchFamily="18" charset="0"/>
+            </a:endParaRPr>
+          </a:p>
+        </p:txBody>
+      </p:sp>
+      <p:sp>
+        <p:nvSpPr>
+          <p:cNvPr id="18" name="Text Box 19">
+            <a:extLst>
+              <a:ext uri="{FF2B5EF4-FFF2-40B4-BE49-F238E27FC236}">
+                <a16:creationId xmlns:a16="http://schemas.microsoft.com/office/drawing/2014/main" id="{3DF589FB-23F8-A98D-6810-789D7E00CE39}"/>
+              </a:ext>
+            </a:extLst>
+          </p:cNvPr>
+          <p:cNvSpPr txBox="1"/>
+          <p:nvPr/>
+        </p:nvSpPr>
+        <p:spPr>
+          <a:xfrm>
+            <a:off x="3988277" y="5488570"/>
+            <a:ext cx="1612265" cy="361950"/>
+          </a:xfrm>
+          <a:prstGeom prst="roundRect">
+            <a:avLst/>
+          </a:prstGeom>
+          <a:solidFill>
+            <a:schemeClr val="accent6">
+              <a:lumMod val="20000"/>
+              <a:lumOff val="80000"/>
+            </a:schemeClr>
+          </a:solidFill>
+          <a:ln w="28575">
+            <a:solidFill>
+              <a:schemeClr val="accent6"/>
+            </a:solidFill>
+          </a:ln>
+        </p:spPr>
+        <p:txBody>
+          <a:bodyPr rot="0" spcFirstLastPara="0" vert="horz" wrap="square" lIns="91440" tIns="45720" rIns="91440" bIns="45720" numCol="1" spcCol="0" rtlCol="0" fromWordArt="0" anchor="ctr" anchorCtr="0" forceAA="0" compatLnSpc="1">
+            <a:prstTxWarp prst="textNoShape">
+              <a:avLst/>
+            </a:prstTxWarp>
+            <a:noAutofit/>
+          </a:bodyPr>
+          <a:lstStyle/>
+          <a:p>
+            <a:pPr algn="ctr">
+              <a:lnSpc>
+                <a:spcPct val="107000"/>
+              </a:lnSpc>
+              <a:spcAft>
+                <a:spcPts val="800"/>
+              </a:spcAft>
+            </a:pPr>
+            <a:r>
+              <a:rPr lang="en-IN" sz="1100" b="1">
+                <a:effectLst/>
+                <a:latin typeface="Trebuchet MS" panose="020B0603020202020204" pitchFamily="34" charset="0"/>
+                <a:ea typeface="Calibri" panose="020F0502020204030204" pitchFamily="34" charset="0"/>
+                <a:cs typeface="Mangal" panose="02040503050203030202" pitchFamily="18" charset="0"/>
+              </a:rPr>
+              <a:t>List of posts/polls</a:t>
+            </a:r>
+            <a:endParaRPr lang="en-IN" sz="1100">
+              <a:effectLst/>
+              <a:latin typeface="Calibri" panose="020F0502020204030204" pitchFamily="34" charset="0"/>
+              <a:ea typeface="Calibri" panose="020F0502020204030204" pitchFamily="34" charset="0"/>
+              <a:cs typeface="Mangal" panose="02040503050203030202" pitchFamily="18" charset="0"/>
+            </a:endParaRPr>
+          </a:p>
+        </p:txBody>
+      </p:sp>
+      <p:sp>
+        <p:nvSpPr>
+          <p:cNvPr id="19" name="Text Box 27">
+            <a:extLst>
+              <a:ext uri="{FF2B5EF4-FFF2-40B4-BE49-F238E27FC236}">
+                <a16:creationId xmlns:a16="http://schemas.microsoft.com/office/drawing/2014/main" id="{66A476F6-6898-C935-7EE4-2AFB0154266B}"/>
+              </a:ext>
+            </a:extLst>
+          </p:cNvPr>
+          <p:cNvSpPr txBox="1"/>
+          <p:nvPr/>
+        </p:nvSpPr>
+        <p:spPr>
+          <a:xfrm>
+            <a:off x="3988277" y="4743578"/>
+            <a:ext cx="1612265" cy="400050"/>
+          </a:xfrm>
+          <a:prstGeom prst="roundRect">
+            <a:avLst/>
+          </a:prstGeom>
+          <a:solidFill>
+            <a:schemeClr val="accent6">
+              <a:lumMod val="20000"/>
+              <a:lumOff val="80000"/>
+            </a:schemeClr>
+          </a:solidFill>
+          <a:ln w="28575">
+            <a:solidFill>
+              <a:schemeClr val="accent6"/>
+            </a:solidFill>
+          </a:ln>
+        </p:spPr>
+        <p:txBody>
+          <a:bodyPr rot="0" spcFirstLastPara="0" vert="horz" wrap="square" lIns="91440" tIns="45720" rIns="91440" bIns="45720" numCol="1" spcCol="0" rtlCol="0" fromWordArt="0" anchor="ctr" anchorCtr="0" forceAA="0" compatLnSpc="1">
+            <a:prstTxWarp prst="textNoShape">
+              <a:avLst/>
+            </a:prstTxWarp>
+            <a:noAutofit/>
+          </a:bodyPr>
+          <a:lstStyle/>
+          <a:p>
+            <a:pPr algn="ctr">
+              <a:lnSpc>
+                <a:spcPct val="107000"/>
+              </a:lnSpc>
+              <a:spcAft>
+                <a:spcPts val="800"/>
+              </a:spcAft>
+            </a:pPr>
+            <a:r>
+              <a:rPr lang="en-IN" sz="1100" b="1">
+                <a:effectLst/>
+                <a:latin typeface="Trebuchet MS" panose="020B0603020202020204" pitchFamily="34" charset="0"/>
+                <a:ea typeface="Calibri" panose="020F0502020204030204" pitchFamily="34" charset="0"/>
+                <a:cs typeface="Mangal" panose="02040503050203030202" pitchFamily="18" charset="0"/>
+              </a:rPr>
+              <a:t>Add/delete post/poll</a:t>
+            </a:r>
+            <a:endParaRPr lang="en-IN" sz="1100">
+              <a:effectLst/>
+              <a:latin typeface="Calibri" panose="020F0502020204030204" pitchFamily="34" charset="0"/>
+              <a:ea typeface="Calibri" panose="020F0502020204030204" pitchFamily="34" charset="0"/>
+              <a:cs typeface="Mangal" panose="02040503050203030202" pitchFamily="18" charset="0"/>
+            </a:endParaRPr>
+          </a:p>
+        </p:txBody>
+      </p:sp>
+      <p:sp>
+        <p:nvSpPr>
+          <p:cNvPr id="20" name="Text Box 30">
+            <a:extLst>
+              <a:ext uri="{FF2B5EF4-FFF2-40B4-BE49-F238E27FC236}">
+                <a16:creationId xmlns:a16="http://schemas.microsoft.com/office/drawing/2014/main" id="{49CD3620-84F8-F525-CA4F-41F5CC3E6C9B}"/>
+              </a:ext>
+            </a:extLst>
+          </p:cNvPr>
+          <p:cNvSpPr txBox="1"/>
+          <p:nvPr/>
+        </p:nvSpPr>
+        <p:spPr>
+          <a:xfrm>
+            <a:off x="6256725" y="5531889"/>
+            <a:ext cx="1748790" cy="506730"/>
+          </a:xfrm>
+          <a:prstGeom prst="roundRect">
+            <a:avLst/>
+          </a:prstGeom>
+          <a:solidFill>
+            <a:schemeClr val="accent6">
+              <a:lumMod val="20000"/>
+              <a:lumOff val="80000"/>
+            </a:schemeClr>
+          </a:solidFill>
+          <a:ln w="28575">
+            <a:solidFill>
+              <a:schemeClr val="accent6"/>
+            </a:solidFill>
+          </a:ln>
+        </p:spPr>
+        <p:txBody>
+          <a:bodyPr rot="0" spcFirstLastPara="0" vert="horz" wrap="square" lIns="91440" tIns="45720" rIns="91440" bIns="45720" numCol="1" spcCol="0" rtlCol="0" fromWordArt="0" anchor="ctr" anchorCtr="0" forceAA="0" compatLnSpc="1">
+            <a:prstTxWarp prst="textNoShape">
+              <a:avLst/>
+            </a:prstTxWarp>
+            <a:noAutofit/>
+          </a:bodyPr>
+          <a:lstStyle/>
+          <a:p>
+            <a:pPr algn="ctr">
+              <a:lnSpc>
+                <a:spcPct val="107000"/>
+              </a:lnSpc>
+              <a:spcAft>
+                <a:spcPts val="800"/>
+              </a:spcAft>
+            </a:pPr>
+            <a:r>
+              <a:rPr lang="en-IN" sz="1100" b="1">
+                <a:effectLst/>
+                <a:latin typeface="Trebuchet MS" panose="020B0603020202020204" pitchFamily="34" charset="0"/>
+                <a:ea typeface="Calibri" panose="020F0502020204030204" pitchFamily="34" charset="0"/>
+                <a:cs typeface="Mangal" panose="02040503050203030202" pitchFamily="18" charset="0"/>
+              </a:rPr>
+              <a:t>Add/delete/view resources to students</a:t>
+            </a:r>
+            <a:endParaRPr lang="en-IN" sz="1100">
+              <a:effectLst/>
+              <a:latin typeface="Calibri" panose="020F0502020204030204" pitchFamily="34" charset="0"/>
+              <a:ea typeface="Calibri" panose="020F0502020204030204" pitchFamily="34" charset="0"/>
+              <a:cs typeface="Mangal" panose="02040503050203030202" pitchFamily="18" charset="0"/>
+            </a:endParaRPr>
+          </a:p>
+        </p:txBody>
+      </p:sp>
+      <p:sp>
+        <p:nvSpPr>
+          <p:cNvPr id="21" name="Text Box 31">
+            <a:extLst>
+              <a:ext uri="{FF2B5EF4-FFF2-40B4-BE49-F238E27FC236}">
+                <a16:creationId xmlns:a16="http://schemas.microsoft.com/office/drawing/2014/main" id="{EC9F9EAF-F3C4-DD48-D56E-E4D27658A8A2}"/>
+              </a:ext>
+            </a:extLst>
+          </p:cNvPr>
+          <p:cNvSpPr txBox="1"/>
+          <p:nvPr/>
+        </p:nvSpPr>
+        <p:spPr>
+          <a:xfrm>
+            <a:off x="8431193" y="6093034"/>
+            <a:ext cx="1950720" cy="560070"/>
+          </a:xfrm>
+          <a:prstGeom prst="roundRect">
+            <a:avLst/>
+          </a:prstGeom>
+          <a:solidFill>
+            <a:schemeClr val="accent6">
+              <a:lumMod val="20000"/>
+              <a:lumOff val="80000"/>
+            </a:schemeClr>
+          </a:solidFill>
+          <a:ln w="28575">
+            <a:solidFill>
+              <a:schemeClr val="accent6"/>
+            </a:solidFill>
+          </a:ln>
+        </p:spPr>
+        <p:txBody>
+          <a:bodyPr rot="0" spcFirstLastPara="0" vert="horz" wrap="square" lIns="91440" tIns="45720" rIns="91440" bIns="45720" numCol="1" spcCol="0" rtlCol="0" fromWordArt="0" anchor="ctr" anchorCtr="0" forceAA="0" compatLnSpc="1">
+            <a:prstTxWarp prst="textNoShape">
+              <a:avLst/>
+            </a:prstTxWarp>
+            <a:noAutofit/>
+          </a:bodyPr>
+          <a:lstStyle/>
+          <a:p>
+            <a:pPr algn="ctr">
+              <a:lnSpc>
+                <a:spcPct val="107000"/>
+              </a:lnSpc>
+              <a:spcAft>
+                <a:spcPts val="800"/>
+              </a:spcAft>
+            </a:pPr>
+            <a:r>
+              <a:rPr lang="en-IN" sz="1100" b="1">
+                <a:effectLst/>
+                <a:latin typeface="Trebuchet MS" panose="020B0603020202020204" pitchFamily="34" charset="0"/>
+                <a:ea typeface="Calibri" panose="020F0502020204030204" pitchFamily="34" charset="0"/>
+                <a:cs typeface="Mangal" panose="02040503050203030202" pitchFamily="18" charset="0"/>
+              </a:rPr>
+              <a:t>Add/delete/view admins/T&amp;P coordinators</a:t>
+            </a:r>
+            <a:endParaRPr lang="en-IN" sz="1100">
+              <a:effectLst/>
+              <a:latin typeface="Calibri" panose="020F0502020204030204" pitchFamily="34" charset="0"/>
+              <a:ea typeface="Calibri" panose="020F0502020204030204" pitchFamily="34" charset="0"/>
+              <a:cs typeface="Mangal" panose="02040503050203030202" pitchFamily="18" charset="0"/>
+            </a:endParaRPr>
+          </a:p>
+        </p:txBody>
+      </p:sp>
+      <p:sp>
+        <p:nvSpPr>
+          <p:cNvPr id="22" name="Text Box 33">
+            <a:extLst>
+              <a:ext uri="{FF2B5EF4-FFF2-40B4-BE49-F238E27FC236}">
+                <a16:creationId xmlns:a16="http://schemas.microsoft.com/office/drawing/2014/main" id="{71143327-10B4-349D-4EF5-F405D5A829DE}"/>
+              </a:ext>
+            </a:extLst>
+          </p:cNvPr>
+          <p:cNvSpPr txBox="1"/>
+          <p:nvPr/>
+        </p:nvSpPr>
+        <p:spPr>
+          <a:xfrm>
+            <a:off x="10778055" y="5520552"/>
+            <a:ext cx="1748790" cy="506730"/>
+          </a:xfrm>
+          <a:prstGeom prst="roundRect">
+            <a:avLst/>
+          </a:prstGeom>
+          <a:solidFill>
+            <a:schemeClr val="accent6">
+              <a:lumMod val="20000"/>
+              <a:lumOff val="80000"/>
+            </a:schemeClr>
+          </a:solidFill>
+          <a:ln w="28575">
+            <a:solidFill>
+              <a:schemeClr val="accent6"/>
+            </a:solidFill>
+          </a:ln>
+        </p:spPr>
+        <p:txBody>
+          <a:bodyPr rot="0" spcFirstLastPara="0" vert="horz" wrap="square" lIns="91440" tIns="45720" rIns="91440" bIns="45720" numCol="1" spcCol="0" rtlCol="0" fromWordArt="0" anchor="ctr" anchorCtr="0" forceAA="0" compatLnSpc="1">
+            <a:prstTxWarp prst="textNoShape">
+              <a:avLst/>
+            </a:prstTxWarp>
+            <a:noAutofit/>
+          </a:bodyPr>
+          <a:lstStyle/>
+          <a:p>
+            <a:pPr algn="ctr">
+              <a:lnSpc>
+                <a:spcPct val="107000"/>
+              </a:lnSpc>
+              <a:spcAft>
+                <a:spcPts val="800"/>
+              </a:spcAft>
+            </a:pPr>
+            <a:r>
+              <a:rPr lang="en-IN" sz="1100" b="1">
+                <a:effectLst/>
+                <a:latin typeface="Trebuchet MS" panose="020B0603020202020204" pitchFamily="34" charset="0"/>
+                <a:ea typeface="Calibri" panose="020F0502020204030204" pitchFamily="34" charset="0"/>
+                <a:cs typeface="Mangal" panose="02040503050203030202" pitchFamily="18" charset="0"/>
+              </a:rPr>
+              <a:t>Add/delete/view students on database</a:t>
+            </a:r>
+            <a:endParaRPr lang="en-IN" sz="1100">
+              <a:effectLst/>
+              <a:latin typeface="Calibri" panose="020F0502020204030204" pitchFamily="34" charset="0"/>
+              <a:ea typeface="Calibri" panose="020F0502020204030204" pitchFamily="34" charset="0"/>
+              <a:cs typeface="Mangal" panose="02040503050203030202" pitchFamily="18" charset="0"/>
+            </a:endParaRPr>
+          </a:p>
+        </p:txBody>
+      </p:sp>
+      <p:sp>
+        <p:nvSpPr>
+          <p:cNvPr id="23" name="Text Box 35">
+            <a:extLst>
+              <a:ext uri="{FF2B5EF4-FFF2-40B4-BE49-F238E27FC236}">
+                <a16:creationId xmlns:a16="http://schemas.microsoft.com/office/drawing/2014/main" id="{B0AF1FC7-76DC-5BE6-5D97-819DCAAFC285}"/>
+              </a:ext>
+            </a:extLst>
+          </p:cNvPr>
+          <p:cNvSpPr txBox="1"/>
+          <p:nvPr/>
+        </p:nvSpPr>
+        <p:spPr>
+          <a:xfrm>
+            <a:off x="12836205" y="4769010"/>
+            <a:ext cx="1748790" cy="765810"/>
+          </a:xfrm>
+          <a:prstGeom prst="roundRect">
+            <a:avLst/>
+          </a:prstGeom>
+          <a:solidFill>
+            <a:schemeClr val="accent6">
+              <a:lumMod val="20000"/>
+              <a:lumOff val="80000"/>
+            </a:schemeClr>
+          </a:solidFill>
+          <a:ln w="28575">
+            <a:solidFill>
+              <a:schemeClr val="accent6"/>
+            </a:solidFill>
+          </a:ln>
+        </p:spPr>
+        <p:txBody>
+          <a:bodyPr rot="0" spcFirstLastPara="0" vert="horz" wrap="square" lIns="91440" tIns="45720" rIns="91440" bIns="45720" numCol="1" spcCol="0" rtlCol="0" fromWordArt="0" anchor="ctr" anchorCtr="0" forceAA="0" compatLnSpc="1">
+            <a:prstTxWarp prst="textNoShape">
+              <a:avLst/>
+            </a:prstTxWarp>
+            <a:noAutofit/>
+          </a:bodyPr>
+          <a:lstStyle/>
+          <a:p>
+            <a:pPr algn="ctr">
+              <a:lnSpc>
+                <a:spcPct val="107000"/>
+              </a:lnSpc>
+              <a:spcAft>
+                <a:spcPts val="800"/>
+              </a:spcAft>
+            </a:pPr>
+            <a:r>
+              <a:rPr lang="en-IN" sz="1100" b="1">
+                <a:effectLst/>
+                <a:latin typeface="Trebuchet MS" panose="020B0603020202020204" pitchFamily="34" charset="0"/>
+                <a:ea typeface="Calibri" panose="020F0502020204030204" pitchFamily="34" charset="0"/>
+                <a:cs typeface="Mangal" panose="02040503050203030202" pitchFamily="18" charset="0"/>
+              </a:rPr>
+              <a:t>View/delete off campus opportunities posted by students</a:t>
+            </a:r>
+            <a:endParaRPr lang="en-IN" sz="1100">
+              <a:effectLst/>
+              <a:latin typeface="Calibri" panose="020F0502020204030204" pitchFamily="34" charset="0"/>
+              <a:ea typeface="Calibri" panose="020F0502020204030204" pitchFamily="34" charset="0"/>
+              <a:cs typeface="Mangal" panose="02040503050203030202" pitchFamily="18" charset="0"/>
+            </a:endParaRPr>
+          </a:p>
+        </p:txBody>
+      </p:sp>
+      <p:sp>
+        <p:nvSpPr>
+          <p:cNvPr id="24" name="Text Box 37">
+            <a:extLst>
+              <a:ext uri="{FF2B5EF4-FFF2-40B4-BE49-F238E27FC236}">
+                <a16:creationId xmlns:a16="http://schemas.microsoft.com/office/drawing/2014/main" id="{ABE4F855-B801-CE3F-9BA1-A45F8A9F963D}"/>
+              </a:ext>
+            </a:extLst>
+          </p:cNvPr>
+          <p:cNvSpPr txBox="1"/>
+          <p:nvPr/>
+        </p:nvSpPr>
+        <p:spPr>
+          <a:xfrm>
+            <a:off x="15023624" y="3896306"/>
+            <a:ext cx="1748790" cy="506730"/>
+          </a:xfrm>
+          <a:prstGeom prst="roundRect">
+            <a:avLst/>
+          </a:prstGeom>
+          <a:solidFill>
+            <a:schemeClr val="accent6">
+              <a:lumMod val="20000"/>
+              <a:lumOff val="80000"/>
+            </a:schemeClr>
+          </a:solidFill>
+          <a:ln w="28575">
+            <a:solidFill>
+              <a:schemeClr val="accent6"/>
+            </a:solidFill>
+          </a:ln>
+        </p:spPr>
+        <p:txBody>
+          <a:bodyPr rot="0" spcFirstLastPara="0" vert="horz" wrap="square" lIns="91440" tIns="45720" rIns="91440" bIns="45720" numCol="1" spcCol="0" rtlCol="0" fromWordArt="0" anchor="ctr" anchorCtr="0" forceAA="0" compatLnSpc="1">
+            <a:prstTxWarp prst="textNoShape">
+              <a:avLst/>
+            </a:prstTxWarp>
+            <a:noAutofit/>
+          </a:bodyPr>
+          <a:lstStyle/>
+          <a:p>
+            <a:pPr algn="ctr">
+              <a:lnSpc>
+                <a:spcPct val="107000"/>
+              </a:lnSpc>
+              <a:spcAft>
+                <a:spcPts val="800"/>
+              </a:spcAft>
+            </a:pPr>
+            <a:r>
+              <a:rPr lang="en-IN" sz="1100" b="1">
+                <a:effectLst/>
+                <a:latin typeface="Trebuchet MS" panose="020B0603020202020204" pitchFamily="34" charset="0"/>
+                <a:ea typeface="Calibri" panose="020F0502020204030204" pitchFamily="34" charset="0"/>
+                <a:cs typeface="Mangal" panose="02040503050203030202" pitchFamily="18" charset="0"/>
+              </a:rPr>
+              <a:t>Add/delete/view students on database</a:t>
+            </a:r>
+            <a:endParaRPr lang="en-IN" sz="1100">
+              <a:effectLst/>
+              <a:latin typeface="Calibri" panose="020F0502020204030204" pitchFamily="34" charset="0"/>
+              <a:ea typeface="Calibri" panose="020F0502020204030204" pitchFamily="34" charset="0"/>
+              <a:cs typeface="Mangal" panose="02040503050203030202" pitchFamily="18" charset="0"/>
+            </a:endParaRPr>
+          </a:p>
+        </p:txBody>
+      </p:sp>
+      <p:cxnSp>
+        <p:nvCxnSpPr>
+          <p:cNvPr id="30" name="Connector: Curved 29">
+            <a:extLst>
+              <a:ext uri="{FF2B5EF4-FFF2-40B4-BE49-F238E27FC236}">
+                <a16:creationId xmlns:a16="http://schemas.microsoft.com/office/drawing/2014/main" id="{02424EE3-93B6-2A03-FEBB-230543AE02E5}"/>
+              </a:ext>
+            </a:extLst>
+          </p:cNvPr>
+          <p:cNvCxnSpPr>
+            <a:cxnSpLocks/>
+            <a:stCxn id="10" idx="2"/>
+            <a:endCxn id="3" idx="0"/>
+          </p:cNvCxnSpPr>
+          <p:nvPr/>
+        </p:nvCxnSpPr>
+        <p:spPr>
+          <a:xfrm rot="5400000" flipH="1">
+            <a:off x="5872860" y="-513108"/>
+            <a:ext cx="143841" cy="6923544"/>
+          </a:xfrm>
+          <a:prstGeom prst="curvedConnector5">
+            <a:avLst>
+              <a:gd name="adj1" fmla="val -158925"/>
+              <a:gd name="adj2" fmla="val 50727"/>
+              <a:gd name="adj3" fmla="val 258925"/>
+            </a:avLst>
+          </a:prstGeom>
+          <a:ln w="28575">
+            <a:headEnd type="none" w="med" len="med"/>
+            <a:tailEnd type="arrow" w="med" len="med"/>
+          </a:ln>
+        </p:spPr>
+        <p:style>
+          <a:lnRef idx="3">
+            <a:schemeClr val="dk1"/>
+          </a:lnRef>
+          <a:fillRef idx="0">
+            <a:schemeClr val="dk1"/>
+          </a:fillRef>
+          <a:effectRef idx="2">
+            <a:schemeClr val="dk1"/>
+          </a:effectRef>
+          <a:fontRef idx="minor">
+            <a:schemeClr val="tx1"/>
+          </a:fontRef>
+        </p:style>
+      </p:cxnSp>
+      <p:cxnSp>
+        <p:nvCxnSpPr>
+          <p:cNvPr id="33" name="Connector: Curved 32">
+            <a:extLst>
+              <a:ext uri="{FF2B5EF4-FFF2-40B4-BE49-F238E27FC236}">
+                <a16:creationId xmlns:a16="http://schemas.microsoft.com/office/drawing/2014/main" id="{F0AB800A-1BC6-F58F-D60E-CFAF4DCC8BAA}"/>
+              </a:ext>
+            </a:extLst>
+          </p:cNvPr>
+          <p:cNvCxnSpPr>
+            <a:cxnSpLocks/>
+            <a:stCxn id="10" idx="2"/>
+            <a:endCxn id="4" idx="0"/>
+          </p:cNvCxnSpPr>
+          <p:nvPr/>
+        </p:nvCxnSpPr>
+        <p:spPr>
+          <a:xfrm rot="5400000">
+            <a:off x="6752355" y="1079342"/>
+            <a:ext cx="712957" cy="4595440"/>
+          </a:xfrm>
+          <a:prstGeom prst="curvedConnector3">
+            <a:avLst>
+              <a:gd name="adj1" fmla="val 50000"/>
+            </a:avLst>
+          </a:prstGeom>
+          <a:ln w="28575">
+            <a:headEnd type="none" w="med" len="med"/>
+            <a:tailEnd type="arrow" w="med" len="med"/>
+          </a:ln>
+        </p:spPr>
+        <p:style>
+          <a:lnRef idx="3">
+            <a:schemeClr val="dk1"/>
+          </a:lnRef>
+          <a:fillRef idx="0">
+            <a:schemeClr val="dk1"/>
+          </a:fillRef>
+          <a:effectRef idx="2">
+            <a:schemeClr val="dk1"/>
+          </a:effectRef>
+          <a:fontRef idx="minor">
+            <a:schemeClr val="tx1"/>
+          </a:fontRef>
+        </p:style>
+      </p:cxnSp>
+      <p:cxnSp>
+        <p:nvCxnSpPr>
+          <p:cNvPr id="38" name="Connector: Curved 37">
+            <a:extLst>
+              <a:ext uri="{FF2B5EF4-FFF2-40B4-BE49-F238E27FC236}">
+                <a16:creationId xmlns:a16="http://schemas.microsoft.com/office/drawing/2014/main" id="{47575CC2-A314-E2DF-94C6-CBA657C6B31C}"/>
+              </a:ext>
+            </a:extLst>
+          </p:cNvPr>
+          <p:cNvCxnSpPr>
+            <a:cxnSpLocks/>
+            <a:stCxn id="10" idx="2"/>
+            <a:endCxn id="5" idx="0"/>
+          </p:cNvCxnSpPr>
+          <p:nvPr/>
+        </p:nvCxnSpPr>
+        <p:spPr>
+          <a:xfrm rot="5400000">
+            <a:off x="7540323" y="2634760"/>
+            <a:ext cx="1480406" cy="2252054"/>
+          </a:xfrm>
+          <a:prstGeom prst="curvedConnector3">
+            <a:avLst/>
+          </a:prstGeom>
+          <a:ln w="28575">
+            <a:headEnd type="none" w="med" len="med"/>
+            <a:tailEnd type="arrow" w="med" len="med"/>
+          </a:ln>
+        </p:spPr>
+        <p:style>
+          <a:lnRef idx="3">
+            <a:schemeClr val="dk1"/>
+          </a:lnRef>
+          <a:fillRef idx="0">
+            <a:schemeClr val="dk1"/>
+          </a:fillRef>
+          <a:effectRef idx="2">
+            <a:schemeClr val="dk1"/>
+          </a:effectRef>
+          <a:fontRef idx="minor">
+            <a:schemeClr val="tx1"/>
+          </a:fontRef>
+        </p:style>
+      </p:cxnSp>
+      <p:cxnSp>
+        <p:nvCxnSpPr>
+          <p:cNvPr id="41" name="Connector: Curved 40">
+            <a:extLst>
+              <a:ext uri="{FF2B5EF4-FFF2-40B4-BE49-F238E27FC236}">
+                <a16:creationId xmlns:a16="http://schemas.microsoft.com/office/drawing/2014/main" id="{47399120-622F-6B27-0EE7-A097FB7A45E1}"/>
+              </a:ext>
+            </a:extLst>
+          </p:cNvPr>
+          <p:cNvCxnSpPr>
+            <a:cxnSpLocks/>
+            <a:stCxn id="10" idx="2"/>
+            <a:endCxn id="6" idx="0"/>
+          </p:cNvCxnSpPr>
+          <p:nvPr/>
+        </p:nvCxnSpPr>
+        <p:spPr>
+          <a:xfrm rot="5400000">
+            <a:off x="8386578" y="4040559"/>
+            <a:ext cx="2039950" cy="12700"/>
+          </a:xfrm>
+          <a:prstGeom prst="curvedConnector3">
+            <a:avLst/>
+          </a:prstGeom>
+          <a:ln w="28575">
+            <a:headEnd type="none" w="med" len="med"/>
+            <a:tailEnd type="arrow" w="med" len="med"/>
+          </a:ln>
+        </p:spPr>
+        <p:style>
+          <a:lnRef idx="3">
+            <a:schemeClr val="dk1"/>
+          </a:lnRef>
+          <a:fillRef idx="0">
+            <a:schemeClr val="dk1"/>
+          </a:fillRef>
+          <a:effectRef idx="2">
+            <a:schemeClr val="dk1"/>
+          </a:effectRef>
+          <a:fontRef idx="minor">
+            <a:schemeClr val="tx1"/>
+          </a:fontRef>
+        </p:style>
+      </p:cxnSp>
+      <p:cxnSp>
+        <p:nvCxnSpPr>
+          <p:cNvPr id="45" name="Connector: Curved 44">
+            <a:extLst>
+              <a:ext uri="{FF2B5EF4-FFF2-40B4-BE49-F238E27FC236}">
+                <a16:creationId xmlns:a16="http://schemas.microsoft.com/office/drawing/2014/main" id="{79F0D0FB-29B8-E36A-3FD0-4EBD6B7F636F}"/>
+              </a:ext>
+            </a:extLst>
+          </p:cNvPr>
+          <p:cNvCxnSpPr>
+            <a:cxnSpLocks/>
+            <a:stCxn id="10" idx="2"/>
+            <a:endCxn id="7" idx="0"/>
+          </p:cNvCxnSpPr>
+          <p:nvPr/>
+        </p:nvCxnSpPr>
+        <p:spPr>
+          <a:xfrm rot="16200000" flipH="1">
+            <a:off x="9789298" y="2637838"/>
+            <a:ext cx="1480406" cy="2245897"/>
+          </a:xfrm>
+          <a:prstGeom prst="curvedConnector3">
+            <a:avLst/>
+          </a:prstGeom>
+          <a:ln w="28575">
+            <a:headEnd type="none" w="med" len="med"/>
+            <a:tailEnd type="arrow" w="med" len="med"/>
+          </a:ln>
+        </p:spPr>
+        <p:style>
+          <a:lnRef idx="3">
+            <a:schemeClr val="dk1"/>
+          </a:lnRef>
+          <a:fillRef idx="0">
+            <a:schemeClr val="dk1"/>
+          </a:fillRef>
+          <a:effectRef idx="2">
+            <a:schemeClr val="dk1"/>
+          </a:effectRef>
+          <a:fontRef idx="minor">
+            <a:schemeClr val="tx1"/>
+          </a:fontRef>
+        </p:style>
+      </p:cxnSp>
+      <p:cxnSp>
+        <p:nvCxnSpPr>
+          <p:cNvPr id="48" name="Connector: Curved 47">
+            <a:extLst>
+              <a:ext uri="{FF2B5EF4-FFF2-40B4-BE49-F238E27FC236}">
+                <a16:creationId xmlns:a16="http://schemas.microsoft.com/office/drawing/2014/main" id="{A487A111-57E7-9B2B-9D6A-3B8F7020971A}"/>
+              </a:ext>
+            </a:extLst>
+          </p:cNvPr>
+          <p:cNvCxnSpPr>
+            <a:cxnSpLocks/>
+            <a:stCxn id="10" idx="2"/>
+            <a:endCxn id="8" idx="0"/>
+          </p:cNvCxnSpPr>
+          <p:nvPr/>
+        </p:nvCxnSpPr>
+        <p:spPr>
+          <a:xfrm rot="16200000" flipH="1">
+            <a:off x="11204546" y="1222590"/>
+            <a:ext cx="708061" cy="4304047"/>
+          </a:xfrm>
+          <a:prstGeom prst="curvedConnector3">
+            <a:avLst>
+              <a:gd name="adj1" fmla="val 50000"/>
+            </a:avLst>
+          </a:prstGeom>
+          <a:ln w="28575">
+            <a:headEnd type="none" w="med" len="med"/>
+            <a:tailEnd type="arrow" w="med" len="med"/>
+          </a:ln>
+        </p:spPr>
+        <p:style>
+          <a:lnRef idx="3">
+            <a:schemeClr val="dk1"/>
+          </a:lnRef>
+          <a:fillRef idx="0">
+            <a:schemeClr val="dk1"/>
+          </a:fillRef>
+          <a:effectRef idx="2">
+            <a:schemeClr val="dk1"/>
+          </a:effectRef>
+          <a:fontRef idx="minor">
+            <a:schemeClr val="tx1"/>
+          </a:fontRef>
+        </p:style>
+      </p:cxnSp>
+      <p:cxnSp>
+        <p:nvCxnSpPr>
+          <p:cNvPr id="51" name="Connector: Curved 50">
+            <a:extLst>
+              <a:ext uri="{FF2B5EF4-FFF2-40B4-BE49-F238E27FC236}">
+                <a16:creationId xmlns:a16="http://schemas.microsoft.com/office/drawing/2014/main" id="{97C7B1B2-5555-E663-1299-02845744F0D1}"/>
+              </a:ext>
+            </a:extLst>
+          </p:cNvPr>
+          <p:cNvCxnSpPr>
+            <a:cxnSpLocks/>
+            <a:stCxn id="10" idx="2"/>
+            <a:endCxn id="9" idx="0"/>
+          </p:cNvCxnSpPr>
+          <p:nvPr/>
+        </p:nvCxnSpPr>
+        <p:spPr>
+          <a:xfrm rot="5400000" flipH="1" flipV="1">
+            <a:off x="12547980" y="-264684"/>
+            <a:ext cx="143841" cy="6426696"/>
+          </a:xfrm>
+          <a:prstGeom prst="curvedConnector5">
+            <a:avLst>
+              <a:gd name="adj1" fmla="val -158925"/>
+              <a:gd name="adj2" fmla="val 51756"/>
+              <a:gd name="adj3" fmla="val 258925"/>
+            </a:avLst>
+          </a:prstGeom>
+          <a:ln w="28575">
+            <a:headEnd type="none" w="med" len="med"/>
+            <a:tailEnd type="arrow" w="med" len="med"/>
+          </a:ln>
+        </p:spPr>
+        <p:style>
+          <a:lnRef idx="3">
+            <a:schemeClr val="dk1"/>
+          </a:lnRef>
+          <a:fillRef idx="0">
+            <a:schemeClr val="dk1"/>
+          </a:fillRef>
+          <a:effectRef idx="2">
+            <a:schemeClr val="dk1"/>
+          </a:effectRef>
+          <a:fontRef idx="minor">
+            <a:schemeClr val="tx1"/>
+          </a:fontRef>
+        </p:style>
+      </p:cxnSp>
+      <p:cxnSp>
+        <p:nvCxnSpPr>
+          <p:cNvPr id="61" name="Straight Arrow Connector 60">
+            <a:extLst>
+              <a:ext uri="{FF2B5EF4-FFF2-40B4-BE49-F238E27FC236}">
+                <a16:creationId xmlns:a16="http://schemas.microsoft.com/office/drawing/2014/main" id="{000ABD3C-E561-0B78-D61C-D3BB48739F30}"/>
+              </a:ext>
+            </a:extLst>
+          </p:cNvPr>
+          <p:cNvCxnSpPr>
+            <a:cxnSpLocks/>
+            <a:stCxn id="2" idx="3"/>
+            <a:endCxn id="10" idx="1"/>
+          </p:cNvCxnSpPr>
+          <p:nvPr/>
+        </p:nvCxnSpPr>
+        <p:spPr>
+          <a:xfrm>
+            <a:off x="6234106" y="1807842"/>
+            <a:ext cx="2544749" cy="1042245"/>
+          </a:xfrm>
+          <a:prstGeom prst="straightConnector1">
+            <a:avLst/>
+          </a:prstGeom>
+          <a:ln w="28575">
+            <a:headEnd type="none" w="med" len="med"/>
+            <a:tailEnd type="arrow" w="med" len="med"/>
+          </a:ln>
+        </p:spPr>
+        <p:style>
+          <a:lnRef idx="3">
+            <a:schemeClr val="dk1"/>
+          </a:lnRef>
+          <a:fillRef idx="0">
+            <a:schemeClr val="dk1"/>
+          </a:fillRef>
+          <a:effectRef idx="2">
+            <a:schemeClr val="dk1"/>
+          </a:effectRef>
+          <a:fontRef idx="minor">
+            <a:schemeClr val="tx1"/>
+          </a:fontRef>
+        </p:style>
+      </p:cxnSp>
+      <p:cxnSp>
+        <p:nvCxnSpPr>
+          <p:cNvPr id="65" name="Straight Arrow Connector 64">
+            <a:extLst>
+              <a:ext uri="{FF2B5EF4-FFF2-40B4-BE49-F238E27FC236}">
+                <a16:creationId xmlns:a16="http://schemas.microsoft.com/office/drawing/2014/main" id="{CBC72344-D553-9098-964C-45D23BFD0D8F}"/>
+              </a:ext>
+            </a:extLst>
+          </p:cNvPr>
+          <p:cNvCxnSpPr>
+            <a:cxnSpLocks/>
+            <a:stCxn id="10" idx="3"/>
+            <a:endCxn id="12" idx="1"/>
+          </p:cNvCxnSpPr>
+          <p:nvPr/>
+        </p:nvCxnSpPr>
+        <p:spPr>
+          <a:xfrm flipV="1">
+            <a:off x="10034250" y="1790697"/>
+            <a:ext cx="2657175" cy="1059390"/>
+          </a:xfrm>
+          <a:prstGeom prst="straightConnector1">
+            <a:avLst/>
+          </a:prstGeom>
+          <a:ln w="28575">
+            <a:headEnd type="none" w="med" len="med"/>
+            <a:tailEnd type="arrow" w="med" len="med"/>
+          </a:ln>
+        </p:spPr>
+        <p:style>
+          <a:lnRef idx="3">
+            <a:schemeClr val="dk1"/>
+          </a:lnRef>
+          <a:fillRef idx="0">
+            <a:schemeClr val="dk1"/>
+          </a:fillRef>
+          <a:effectRef idx="2">
+            <a:schemeClr val="dk1"/>
+          </a:effectRef>
+          <a:fontRef idx="minor">
+            <a:schemeClr val="tx1"/>
+          </a:fontRef>
+        </p:style>
+      </p:cxnSp>
+      <p:cxnSp>
+        <p:nvCxnSpPr>
+          <p:cNvPr id="70" name="Connector: Curved 69">
+            <a:extLst>
+              <a:ext uri="{FF2B5EF4-FFF2-40B4-BE49-F238E27FC236}">
+                <a16:creationId xmlns:a16="http://schemas.microsoft.com/office/drawing/2014/main" id="{F8F8BA56-8CBA-ABD4-1CEA-2EBE6926B044}"/>
+              </a:ext>
+            </a:extLst>
+          </p:cNvPr>
+          <p:cNvCxnSpPr>
+            <a:cxnSpLocks/>
+            <a:stCxn id="10" idx="0"/>
+            <a:endCxn id="11" idx="1"/>
+          </p:cNvCxnSpPr>
+          <p:nvPr/>
+        </p:nvCxnSpPr>
+        <p:spPr>
+          <a:xfrm rot="5400000" flipH="1" flipV="1">
+            <a:off x="9547202" y="1720670"/>
+            <a:ext cx="818270" cy="1099569"/>
+          </a:xfrm>
+          <a:prstGeom prst="curvedConnector3">
+            <a:avLst>
+              <a:gd name="adj1" fmla="val 50000"/>
+            </a:avLst>
+          </a:prstGeom>
+          <a:ln w="28575">
+            <a:headEnd type="none" w="med" len="med"/>
+            <a:tailEnd type="arrow" w="med" len="med"/>
+          </a:ln>
+        </p:spPr>
+        <p:style>
+          <a:lnRef idx="3">
+            <a:schemeClr val="dk1"/>
+          </a:lnRef>
+          <a:fillRef idx="0">
+            <a:schemeClr val="dk1"/>
+          </a:fillRef>
+          <a:effectRef idx="2">
+            <a:schemeClr val="dk1"/>
+          </a:effectRef>
+          <a:fontRef idx="minor">
+            <a:schemeClr val="tx1"/>
+          </a:fontRef>
+        </p:style>
+      </p:cxnSp>
+      <p:cxnSp>
+        <p:nvCxnSpPr>
+          <p:cNvPr id="73" name="Straight Arrow Connector 72">
+            <a:extLst>
+              <a:ext uri="{FF2B5EF4-FFF2-40B4-BE49-F238E27FC236}">
+                <a16:creationId xmlns:a16="http://schemas.microsoft.com/office/drawing/2014/main" id="{C8FFC4B8-9238-8C94-9906-17B35E5021BB}"/>
+              </a:ext>
+            </a:extLst>
+          </p:cNvPr>
+          <p:cNvCxnSpPr>
+            <a:cxnSpLocks/>
+            <a:stCxn id="3" idx="2"/>
+            <a:endCxn id="13" idx="0"/>
+          </p:cNvCxnSpPr>
+          <p:nvPr/>
+        </p:nvCxnSpPr>
+        <p:spPr>
+          <a:xfrm>
+            <a:off x="2483009" y="3217738"/>
+            <a:ext cx="20003" cy="665232"/>
+          </a:xfrm>
+          <a:prstGeom prst="straightConnector1">
+            <a:avLst/>
+          </a:prstGeom>
+          <a:ln w="28575">
+            <a:headEnd type="none" w="med" len="med"/>
+            <a:tailEnd type="arrow" w="med" len="med"/>
+          </a:ln>
+        </p:spPr>
+        <p:style>
+          <a:lnRef idx="3">
+            <a:schemeClr val="dk1"/>
+          </a:lnRef>
+          <a:fillRef idx="0">
+            <a:schemeClr val="dk1"/>
+          </a:fillRef>
+          <a:effectRef idx="2">
+            <a:schemeClr val="dk1"/>
+          </a:effectRef>
+          <a:fontRef idx="minor">
+            <a:schemeClr val="tx1"/>
+          </a:fontRef>
+        </p:style>
+      </p:cxnSp>
+      <p:cxnSp>
+        <p:nvCxnSpPr>
+          <p:cNvPr id="76" name="Straight Arrow Connector 75">
+            <a:extLst>
+              <a:ext uri="{FF2B5EF4-FFF2-40B4-BE49-F238E27FC236}">
+                <a16:creationId xmlns:a16="http://schemas.microsoft.com/office/drawing/2014/main" id="{A9F08228-B69E-5999-F7BE-01513ECEBB00}"/>
+              </a:ext>
+            </a:extLst>
+          </p:cNvPr>
+          <p:cNvCxnSpPr>
+            <a:cxnSpLocks/>
+            <a:stCxn id="13" idx="2"/>
+            <a:endCxn id="14" idx="0"/>
+          </p:cNvCxnSpPr>
+          <p:nvPr/>
+        </p:nvCxnSpPr>
+        <p:spPr>
+          <a:xfrm>
+            <a:off x="2503012" y="4391605"/>
+            <a:ext cx="0" cy="236357"/>
+          </a:xfrm>
+          <a:prstGeom prst="straightConnector1">
+            <a:avLst/>
+          </a:prstGeom>
+          <a:ln w="28575">
+            <a:headEnd type="none" w="med" len="med"/>
+            <a:tailEnd type="arrow" w="med" len="med"/>
+          </a:ln>
+        </p:spPr>
+        <p:style>
+          <a:lnRef idx="3">
+            <a:schemeClr val="dk1"/>
+          </a:lnRef>
+          <a:fillRef idx="0">
+            <a:schemeClr val="dk1"/>
+          </a:fillRef>
+          <a:effectRef idx="2">
+            <a:schemeClr val="dk1"/>
+          </a:effectRef>
+          <a:fontRef idx="minor">
+            <a:schemeClr val="tx1"/>
+          </a:fontRef>
+        </p:style>
+      </p:cxnSp>
+      <p:cxnSp>
+        <p:nvCxnSpPr>
+          <p:cNvPr id="79" name="Straight Arrow Connector 78">
+            <a:extLst>
+              <a:ext uri="{FF2B5EF4-FFF2-40B4-BE49-F238E27FC236}">
+                <a16:creationId xmlns:a16="http://schemas.microsoft.com/office/drawing/2014/main" id="{B60CA7B1-CCA2-4439-E26F-E68BE74C0C28}"/>
+              </a:ext>
+            </a:extLst>
+          </p:cNvPr>
+          <p:cNvCxnSpPr>
+            <a:cxnSpLocks/>
+            <a:stCxn id="14" idx="2"/>
+            <a:endCxn id="16" idx="0"/>
+          </p:cNvCxnSpPr>
+          <p:nvPr/>
+        </p:nvCxnSpPr>
+        <p:spPr>
+          <a:xfrm flipH="1">
+            <a:off x="2483009" y="5165172"/>
+            <a:ext cx="20003" cy="236357"/>
+          </a:xfrm>
+          <a:prstGeom prst="straightConnector1">
+            <a:avLst/>
+          </a:prstGeom>
+          <a:ln w="28575">
+            <a:headEnd type="none" w="med" len="med"/>
+            <a:tailEnd type="arrow" w="med" len="med"/>
+          </a:ln>
+        </p:spPr>
+        <p:style>
+          <a:lnRef idx="3">
+            <a:schemeClr val="dk1"/>
+          </a:lnRef>
+          <a:fillRef idx="0">
+            <a:schemeClr val="dk1"/>
+          </a:fillRef>
+          <a:effectRef idx="2">
+            <a:schemeClr val="dk1"/>
+          </a:effectRef>
+          <a:fontRef idx="minor">
+            <a:schemeClr val="tx1"/>
+          </a:fontRef>
+        </p:style>
+      </p:cxnSp>
+      <p:cxnSp>
+        <p:nvCxnSpPr>
+          <p:cNvPr id="82" name="Straight Arrow Connector 81">
+            <a:extLst>
+              <a:ext uri="{FF2B5EF4-FFF2-40B4-BE49-F238E27FC236}">
+                <a16:creationId xmlns:a16="http://schemas.microsoft.com/office/drawing/2014/main" id="{F2111D31-46A4-26ED-0DC3-214CFFEFCAA3}"/>
+              </a:ext>
+            </a:extLst>
+          </p:cNvPr>
+          <p:cNvCxnSpPr>
+            <a:cxnSpLocks/>
+            <a:stCxn id="16" idx="2"/>
+            <a:endCxn id="17" idx="0"/>
+          </p:cNvCxnSpPr>
+          <p:nvPr/>
+        </p:nvCxnSpPr>
+        <p:spPr>
+          <a:xfrm>
+            <a:off x="2483009" y="5938739"/>
+            <a:ext cx="20003" cy="236357"/>
+          </a:xfrm>
+          <a:prstGeom prst="straightConnector1">
+            <a:avLst/>
+          </a:prstGeom>
+          <a:ln w="28575">
+            <a:headEnd type="none" w="med" len="med"/>
+            <a:tailEnd type="arrow" w="med" len="med"/>
+          </a:ln>
+        </p:spPr>
+        <p:style>
+          <a:lnRef idx="3">
+            <a:schemeClr val="dk1"/>
+          </a:lnRef>
+          <a:fillRef idx="0">
+            <a:schemeClr val="dk1"/>
+          </a:fillRef>
+          <a:effectRef idx="2">
+            <a:schemeClr val="dk1"/>
+          </a:effectRef>
+          <a:fontRef idx="minor">
+            <a:schemeClr val="tx1"/>
+          </a:fontRef>
+        </p:style>
+      </p:cxnSp>
+      <p:cxnSp>
+        <p:nvCxnSpPr>
+          <p:cNvPr id="85" name="Straight Arrow Connector 84">
+            <a:extLst>
+              <a:ext uri="{FF2B5EF4-FFF2-40B4-BE49-F238E27FC236}">
+                <a16:creationId xmlns:a16="http://schemas.microsoft.com/office/drawing/2014/main" id="{E0E64583-CF24-7D5E-89FE-C74D04C3959F}"/>
+              </a:ext>
+            </a:extLst>
+          </p:cNvPr>
+          <p:cNvCxnSpPr>
+            <a:cxnSpLocks/>
+            <a:stCxn id="4" idx="2"/>
+            <a:endCxn id="19" idx="0"/>
+          </p:cNvCxnSpPr>
+          <p:nvPr/>
+        </p:nvCxnSpPr>
+        <p:spPr>
+          <a:xfrm flipH="1">
+            <a:off x="4794410" y="4074536"/>
+            <a:ext cx="16703" cy="669042"/>
+          </a:xfrm>
+          <a:prstGeom prst="straightConnector1">
+            <a:avLst/>
+          </a:prstGeom>
+          <a:ln w="28575">
+            <a:headEnd type="none" w="med" len="med"/>
+            <a:tailEnd type="arrow" w="med" len="med"/>
+          </a:ln>
+        </p:spPr>
+        <p:style>
+          <a:lnRef idx="3">
+            <a:schemeClr val="dk1"/>
+          </a:lnRef>
+          <a:fillRef idx="0">
+            <a:schemeClr val="dk1"/>
+          </a:fillRef>
+          <a:effectRef idx="2">
+            <a:schemeClr val="dk1"/>
+          </a:effectRef>
+          <a:fontRef idx="minor">
+            <a:schemeClr val="tx1"/>
+          </a:fontRef>
+        </p:style>
+      </p:cxnSp>
+      <p:cxnSp>
+        <p:nvCxnSpPr>
+          <p:cNvPr id="88" name="Straight Arrow Connector 87">
+            <a:extLst>
+              <a:ext uri="{FF2B5EF4-FFF2-40B4-BE49-F238E27FC236}">
+                <a16:creationId xmlns:a16="http://schemas.microsoft.com/office/drawing/2014/main" id="{01DE30BB-8810-76B4-D489-EE2FCBCBE7C7}"/>
+              </a:ext>
+            </a:extLst>
+          </p:cNvPr>
+          <p:cNvCxnSpPr>
+            <a:cxnSpLocks/>
+            <a:stCxn id="19" idx="2"/>
+            <a:endCxn id="18" idx="0"/>
+          </p:cNvCxnSpPr>
+          <p:nvPr/>
+        </p:nvCxnSpPr>
+        <p:spPr>
+          <a:xfrm>
+            <a:off x="4794410" y="5143628"/>
+            <a:ext cx="0" cy="344942"/>
+          </a:xfrm>
+          <a:prstGeom prst="straightConnector1">
+            <a:avLst/>
+          </a:prstGeom>
+          <a:ln w="28575">
+            <a:headEnd type="none" w="med" len="med"/>
+            <a:tailEnd type="arrow" w="med" len="med"/>
+          </a:ln>
+        </p:spPr>
+        <p:style>
+          <a:lnRef idx="3">
+            <a:schemeClr val="dk1"/>
+          </a:lnRef>
+          <a:fillRef idx="0">
+            <a:schemeClr val="dk1"/>
+          </a:fillRef>
+          <a:effectRef idx="2">
+            <a:schemeClr val="dk1"/>
+          </a:effectRef>
+          <a:fontRef idx="minor">
+            <a:schemeClr val="tx1"/>
+          </a:fontRef>
+        </p:style>
+      </p:cxnSp>
+      <p:cxnSp>
+        <p:nvCxnSpPr>
+          <p:cNvPr id="91" name="Straight Arrow Connector 90">
+            <a:extLst>
+              <a:ext uri="{FF2B5EF4-FFF2-40B4-BE49-F238E27FC236}">
+                <a16:creationId xmlns:a16="http://schemas.microsoft.com/office/drawing/2014/main" id="{F5553D83-AA9B-50F3-9EDE-8EBB07EE9BF0}"/>
+              </a:ext>
+            </a:extLst>
+          </p:cNvPr>
+          <p:cNvCxnSpPr>
+            <a:cxnSpLocks/>
+            <a:stCxn id="18" idx="2"/>
+            <a:endCxn id="15" idx="3"/>
+          </p:cNvCxnSpPr>
+          <p:nvPr/>
+        </p:nvCxnSpPr>
+        <p:spPr>
+          <a:xfrm>
+            <a:off x="4794410" y="5850520"/>
+            <a:ext cx="16702" cy="411617"/>
+          </a:xfrm>
+          <a:prstGeom prst="straightConnector1">
+            <a:avLst/>
+          </a:prstGeom>
+          <a:ln w="28575">
+            <a:headEnd type="none" w="med" len="med"/>
+            <a:tailEnd type="arrow" w="med" len="med"/>
+          </a:ln>
+        </p:spPr>
+        <p:style>
+          <a:lnRef idx="3">
+            <a:schemeClr val="dk1"/>
+          </a:lnRef>
+          <a:fillRef idx="0">
+            <a:schemeClr val="dk1"/>
+          </a:fillRef>
+          <a:effectRef idx="2">
+            <a:schemeClr val="dk1"/>
+          </a:effectRef>
+          <a:fontRef idx="minor">
+            <a:schemeClr val="tx1"/>
+          </a:fontRef>
+        </p:style>
+      </p:cxnSp>
+      <p:cxnSp>
+        <p:nvCxnSpPr>
+          <p:cNvPr id="94" name="Straight Arrow Connector 93">
+            <a:extLst>
+              <a:ext uri="{FF2B5EF4-FFF2-40B4-BE49-F238E27FC236}">
+                <a16:creationId xmlns:a16="http://schemas.microsoft.com/office/drawing/2014/main" id="{6C75B912-E20E-DAC7-F201-E8D266B0F225}"/>
+              </a:ext>
+            </a:extLst>
+          </p:cNvPr>
+          <p:cNvCxnSpPr>
+            <a:cxnSpLocks/>
+            <a:stCxn id="5" idx="2"/>
+            <a:endCxn id="20" idx="0"/>
+          </p:cNvCxnSpPr>
+          <p:nvPr/>
+        </p:nvCxnSpPr>
+        <p:spPr>
+          <a:xfrm flipH="1">
+            <a:off x="7131120" y="4841985"/>
+            <a:ext cx="23379" cy="689904"/>
+          </a:xfrm>
+          <a:prstGeom prst="straightConnector1">
+            <a:avLst/>
+          </a:prstGeom>
+          <a:ln w="28575">
+            <a:headEnd type="none" w="med" len="med"/>
+            <a:tailEnd type="arrow" w="med" len="med"/>
+          </a:ln>
+        </p:spPr>
+        <p:style>
+          <a:lnRef idx="3">
+            <a:schemeClr val="dk1"/>
+          </a:lnRef>
+          <a:fillRef idx="0">
+            <a:schemeClr val="dk1"/>
+          </a:fillRef>
+          <a:effectRef idx="2">
+            <a:schemeClr val="dk1"/>
+          </a:effectRef>
+          <a:fontRef idx="minor">
+            <a:schemeClr val="tx1"/>
+          </a:fontRef>
+        </p:style>
+      </p:cxnSp>
+      <p:cxnSp>
+        <p:nvCxnSpPr>
+          <p:cNvPr id="97" name="Straight Arrow Connector 96">
+            <a:extLst>
+              <a:ext uri="{FF2B5EF4-FFF2-40B4-BE49-F238E27FC236}">
+                <a16:creationId xmlns:a16="http://schemas.microsoft.com/office/drawing/2014/main" id="{EC932E61-6314-DDA0-5BA9-6CD15D512AA9}"/>
+              </a:ext>
+            </a:extLst>
+          </p:cNvPr>
+          <p:cNvCxnSpPr>
+            <a:cxnSpLocks/>
+            <a:stCxn id="6" idx="2"/>
+            <a:endCxn id="21" idx="0"/>
+          </p:cNvCxnSpPr>
+          <p:nvPr/>
+        </p:nvCxnSpPr>
+        <p:spPr>
+          <a:xfrm>
+            <a:off x="9406553" y="5401529"/>
+            <a:ext cx="0" cy="691505"/>
+          </a:xfrm>
+          <a:prstGeom prst="straightConnector1">
+            <a:avLst/>
+          </a:prstGeom>
+          <a:ln w="28575">
+            <a:headEnd type="none" w="med" len="med"/>
+            <a:tailEnd type="arrow" w="med" len="med"/>
+          </a:ln>
+        </p:spPr>
+        <p:style>
+          <a:lnRef idx="3">
+            <a:schemeClr val="dk1"/>
+          </a:lnRef>
+          <a:fillRef idx="0">
+            <a:schemeClr val="dk1"/>
+          </a:fillRef>
+          <a:effectRef idx="2">
+            <a:schemeClr val="dk1"/>
+          </a:effectRef>
+          <a:fontRef idx="minor">
+            <a:schemeClr val="tx1"/>
+          </a:fontRef>
+        </p:style>
+      </p:cxnSp>
+      <p:cxnSp>
+        <p:nvCxnSpPr>
+          <p:cNvPr id="100" name="Straight Arrow Connector 99">
+            <a:extLst>
+              <a:ext uri="{FF2B5EF4-FFF2-40B4-BE49-F238E27FC236}">
+                <a16:creationId xmlns:a16="http://schemas.microsoft.com/office/drawing/2014/main" id="{64F8E7CD-297E-492C-1401-02EB77A222B3}"/>
+              </a:ext>
+            </a:extLst>
+          </p:cNvPr>
+          <p:cNvCxnSpPr>
+            <a:cxnSpLocks/>
+            <a:stCxn id="7" idx="2"/>
+            <a:endCxn id="22" idx="0"/>
+          </p:cNvCxnSpPr>
+          <p:nvPr/>
+        </p:nvCxnSpPr>
+        <p:spPr>
+          <a:xfrm>
+            <a:off x="11652450" y="4841985"/>
+            <a:ext cx="0" cy="678567"/>
+          </a:xfrm>
+          <a:prstGeom prst="straightConnector1">
+            <a:avLst/>
+          </a:prstGeom>
+          <a:ln w="28575">
+            <a:headEnd type="none" w="med" len="med"/>
+            <a:tailEnd type="arrow" w="med" len="med"/>
+          </a:ln>
+        </p:spPr>
+        <p:style>
+          <a:lnRef idx="3">
+            <a:schemeClr val="dk1"/>
+          </a:lnRef>
+          <a:fillRef idx="0">
+            <a:schemeClr val="dk1"/>
+          </a:fillRef>
+          <a:effectRef idx="2">
+            <a:schemeClr val="dk1"/>
+          </a:effectRef>
+          <a:fontRef idx="minor">
+            <a:schemeClr val="tx1"/>
+          </a:fontRef>
+        </p:style>
+      </p:cxnSp>
+      <p:cxnSp>
+        <p:nvCxnSpPr>
+          <p:cNvPr id="103" name="Straight Arrow Connector 102">
+            <a:extLst>
+              <a:ext uri="{FF2B5EF4-FFF2-40B4-BE49-F238E27FC236}">
+                <a16:creationId xmlns:a16="http://schemas.microsoft.com/office/drawing/2014/main" id="{252F2150-AABC-B548-F6A1-9B7C8A91F86D}"/>
+              </a:ext>
+            </a:extLst>
+          </p:cNvPr>
+          <p:cNvCxnSpPr>
+            <a:cxnSpLocks/>
+            <a:stCxn id="8" idx="2"/>
+            <a:endCxn id="23" idx="0"/>
+          </p:cNvCxnSpPr>
+          <p:nvPr/>
+        </p:nvCxnSpPr>
+        <p:spPr>
+          <a:xfrm>
+            <a:off x="13710600" y="4069640"/>
+            <a:ext cx="0" cy="699370"/>
+          </a:xfrm>
+          <a:prstGeom prst="straightConnector1">
+            <a:avLst/>
+          </a:prstGeom>
+          <a:ln w="28575">
+            <a:headEnd type="none" w="med" len="med"/>
+            <a:tailEnd type="arrow" w="med" len="med"/>
+          </a:ln>
+        </p:spPr>
+        <p:style>
+          <a:lnRef idx="3">
+            <a:schemeClr val="dk1"/>
+          </a:lnRef>
+          <a:fillRef idx="0">
+            <a:schemeClr val="dk1"/>
+          </a:fillRef>
+          <a:effectRef idx="2">
+            <a:schemeClr val="dk1"/>
+          </a:effectRef>
+          <a:fontRef idx="minor">
+            <a:schemeClr val="tx1"/>
+          </a:fontRef>
+        </p:style>
+      </p:cxnSp>
+      <p:cxnSp>
+        <p:nvCxnSpPr>
+          <p:cNvPr id="106" name="Straight Arrow Connector 105">
+            <a:extLst>
+              <a:ext uri="{FF2B5EF4-FFF2-40B4-BE49-F238E27FC236}">
+                <a16:creationId xmlns:a16="http://schemas.microsoft.com/office/drawing/2014/main" id="{6036648A-9BD5-19EF-0E5C-C481AE0914AE}"/>
+              </a:ext>
+            </a:extLst>
+          </p:cNvPr>
+          <p:cNvCxnSpPr>
+            <a:cxnSpLocks/>
+            <a:stCxn id="9" idx="2"/>
+            <a:endCxn id="24" idx="0"/>
+          </p:cNvCxnSpPr>
+          <p:nvPr/>
+        </p:nvCxnSpPr>
+        <p:spPr>
+          <a:xfrm>
+            <a:off x="15833249" y="3217738"/>
+            <a:ext cx="64770" cy="678568"/>
+          </a:xfrm>
+          <a:prstGeom prst="straightConnector1">
+            <a:avLst/>
+          </a:prstGeom>
+          <a:ln w="28575">
+            <a:headEnd type="none" w="med" len="med"/>
+            <a:tailEnd type="arrow" w="med" len="med"/>
+          </a:ln>
+        </p:spPr>
+        <p:style>
+          <a:lnRef idx="3">
+            <a:schemeClr val="dk1"/>
+          </a:lnRef>
+          <a:fillRef idx="0">
+            <a:schemeClr val="dk1"/>
+          </a:fillRef>
+          <a:effectRef idx="2">
+            <a:schemeClr val="dk1"/>
+          </a:effectRef>
+          <a:fontRef idx="minor">
+            <a:schemeClr val="tx1"/>
+          </a:fontRef>
+        </p:style>
+      </p:cxnSp>
+    </p:spTree>
+    <p:extLst>
+      <p:ext uri="{BB962C8B-B14F-4D97-AF65-F5344CB8AC3E}">
+        <p14:creationId xmlns:p14="http://schemas.microsoft.com/office/powerpoint/2010/main" val="2949040384"/>
       </p:ext>
     </p:extLst>
   </p:cSld>

</xml_diff>